<commit_message>
Started work on presentation
</commit_message>
<xml_diff>
--- a/Makerspace_Simulation.pptx
+++ b/Makerspace_Simulation.pptx
@@ -5,25 +5,16 @@
     <p:sldMasterId id="2147483650" r:id="rId4"/>
   </p:sldMasterIdLst>
   <p:notesMasterIdLst>
-    <p:notesMasterId r:id="rId18"/>
+    <p:notesMasterId r:id="rId9"/>
   </p:notesMasterIdLst>
   <p:handoutMasterIdLst>
-    <p:handoutMasterId r:id="rId19"/>
+    <p:handoutMasterId r:id="rId10"/>
   </p:handoutMasterIdLst>
   <p:sldIdLst>
     <p:sldId id="312" r:id="rId5"/>
-    <p:sldId id="304" r:id="rId6"/>
-    <p:sldId id="307" r:id="rId7"/>
-    <p:sldId id="281" r:id="rId8"/>
-    <p:sldId id="282" r:id="rId9"/>
-    <p:sldId id="314" r:id="rId10"/>
-    <p:sldId id="315" r:id="rId11"/>
-    <p:sldId id="317" r:id="rId12"/>
-    <p:sldId id="318" r:id="rId13"/>
-    <p:sldId id="319" r:id="rId14"/>
-    <p:sldId id="321" r:id="rId15"/>
-    <p:sldId id="322" r:id="rId16"/>
-    <p:sldId id="297" r:id="rId17"/>
+    <p:sldId id="314" r:id="rId6"/>
+    <p:sldId id="313" r:id="rId7"/>
+    <p:sldId id="315" r:id="rId8"/>
   </p:sldIdLst>
   <p:sldSz cx="12192000" cy="6858000"/>
   <p:notesSz cx="13716000" cy="24384000"/>
@@ -620,1002 +611,6 @@
     <p:extLst>
       <p:ext uri="{BB962C8B-B14F-4D97-AF65-F5344CB8AC3E}">
         <p14:creationId xmlns:p14="http://schemas.microsoft.com/office/powerpoint/2010/main" val="2997654815"/>
-      </p:ext>
-    </p:extLst>
-  </p:cSld>
-  <p:clrMapOvr>
-    <a:masterClrMapping/>
-  </p:clrMapOvr>
-</p:notes>
-</file>
-
-<file path=ppt/notesSlides/notesSlide10.xml><?xml version="1.0" encoding="utf-8"?>
-<p:notes xmlns:a="http://schemas.openxmlformats.org/drawingml/2006/main" xmlns:r="http://schemas.openxmlformats.org/officeDocument/2006/relationships" xmlns:p="http://schemas.openxmlformats.org/presentationml/2006/main">
-  <p:cSld>
-    <p:spTree>
-      <p:nvGrpSpPr>
-        <p:cNvPr id="1" name=""/>
-        <p:cNvGrpSpPr/>
-        <p:nvPr/>
-      </p:nvGrpSpPr>
-      <p:grpSpPr>
-        <a:xfrm>
-          <a:off x="0" y="0"/>
-          <a:ext cx="0" cy="0"/>
-          <a:chOff x="0" y="0"/>
-          <a:chExt cx="0" cy="0"/>
-        </a:xfrm>
-      </p:grpSpPr>
-      <p:sp>
-        <p:nvSpPr>
-          <p:cNvPr id="2" name="Slide Image Placeholder 1"/>
-          <p:cNvSpPr>
-            <a:spLocks noGrp="1" noRot="1" noChangeAspect="1"/>
-          </p:cNvSpPr>
-          <p:nvPr>
-            <p:ph type="sldImg"/>
-          </p:nvPr>
-        </p:nvSpPr>
-        <p:spPr>
-          <a:xfrm>
-            <a:off x="-457200" y="3048000"/>
-            <a:ext cx="14630400" cy="8229600"/>
-          </a:xfrm>
-          <a:prstGeom prst="rect">
-            <a:avLst/>
-          </a:prstGeom>
-          <a:noFill/>
-          <a:ln w="12700">
-            <a:solidFill>
-              <a:prstClr val="black"/>
-            </a:solidFill>
-          </a:ln>
-        </p:spPr>
-      </p:sp>
-      <p:sp>
-        <p:nvSpPr>
-          <p:cNvPr id="3" name="Notes Placeholder 2"/>
-          <p:cNvSpPr>
-            <a:spLocks noGrp="1"/>
-          </p:cNvSpPr>
-          <p:nvPr>
-            <p:ph type="body" idx="1"/>
-          </p:nvPr>
-        </p:nvSpPr>
-        <p:spPr>
-          <a:xfrm>
-            <a:off x="1371600" y="11734800"/>
-            <a:ext cx="10972800" cy="9601200"/>
-          </a:xfrm>
-          <a:prstGeom prst="rect">
-            <a:avLst/>
-          </a:prstGeom>
-        </p:spPr>
-        <p:txBody>
-          <a:bodyPr/>
-          <a:lstStyle/>
-          <a:p>
-            <a:endParaRPr lang="en-US" dirty="0"/>
-          </a:p>
-        </p:txBody>
-      </p:sp>
-    </p:spTree>
-    <p:extLst>
-      <p:ext uri="{BB962C8B-B14F-4D97-AF65-F5344CB8AC3E}">
-        <p14:creationId xmlns:p14="http://schemas.microsoft.com/office/powerpoint/2010/main" val="4110138705"/>
-      </p:ext>
-    </p:extLst>
-  </p:cSld>
-  <p:clrMapOvr>
-    <a:masterClrMapping/>
-  </p:clrMapOvr>
-</p:notes>
-</file>
-
-<file path=ppt/notesSlides/notesSlide11.xml><?xml version="1.0" encoding="utf-8"?>
-<p:notes xmlns:a="http://schemas.openxmlformats.org/drawingml/2006/main" xmlns:r="http://schemas.openxmlformats.org/officeDocument/2006/relationships" xmlns:p="http://schemas.openxmlformats.org/presentationml/2006/main">
-  <p:cSld>
-    <p:spTree>
-      <p:nvGrpSpPr>
-        <p:cNvPr id="1" name=""/>
-        <p:cNvGrpSpPr/>
-        <p:nvPr/>
-      </p:nvGrpSpPr>
-      <p:grpSpPr>
-        <a:xfrm>
-          <a:off x="0" y="0"/>
-          <a:ext cx="0" cy="0"/>
-          <a:chOff x="0" y="0"/>
-          <a:chExt cx="0" cy="0"/>
-        </a:xfrm>
-      </p:grpSpPr>
-      <p:sp>
-        <p:nvSpPr>
-          <p:cNvPr id="2" name="Slide Image Placeholder 1"/>
-          <p:cNvSpPr>
-            <a:spLocks noGrp="1" noRot="1" noChangeAspect="1"/>
-          </p:cNvSpPr>
-          <p:nvPr>
-            <p:ph type="sldImg"/>
-          </p:nvPr>
-        </p:nvSpPr>
-        <p:spPr>
-          <a:xfrm>
-            <a:off x="-457200" y="3048000"/>
-            <a:ext cx="14630400" cy="8229600"/>
-          </a:xfrm>
-          <a:prstGeom prst="rect">
-            <a:avLst/>
-          </a:prstGeom>
-          <a:noFill/>
-          <a:ln w="12700">
-            <a:solidFill>
-              <a:prstClr val="black"/>
-            </a:solidFill>
-          </a:ln>
-        </p:spPr>
-      </p:sp>
-      <p:sp>
-        <p:nvSpPr>
-          <p:cNvPr id="3" name="Notes Placeholder 2"/>
-          <p:cNvSpPr>
-            <a:spLocks noGrp="1"/>
-          </p:cNvSpPr>
-          <p:nvPr>
-            <p:ph type="body" idx="1"/>
-          </p:nvPr>
-        </p:nvSpPr>
-        <p:spPr>
-          <a:xfrm>
-            <a:off x="1371600" y="11734800"/>
-            <a:ext cx="10972800" cy="9601200"/>
-          </a:xfrm>
-          <a:prstGeom prst="rect">
-            <a:avLst/>
-          </a:prstGeom>
-        </p:spPr>
-        <p:txBody>
-          <a:bodyPr/>
-          <a:lstStyle/>
-          <a:p>
-            <a:endParaRPr lang="en-US" dirty="0"/>
-          </a:p>
-        </p:txBody>
-      </p:sp>
-    </p:spTree>
-    <p:extLst>
-      <p:ext uri="{BB962C8B-B14F-4D97-AF65-F5344CB8AC3E}">
-        <p14:creationId xmlns:p14="http://schemas.microsoft.com/office/powerpoint/2010/main" val="3047668310"/>
-      </p:ext>
-    </p:extLst>
-  </p:cSld>
-  <p:clrMapOvr>
-    <a:masterClrMapping/>
-  </p:clrMapOvr>
-</p:notes>
-</file>
-
-<file path=ppt/notesSlides/notesSlide12.xml><?xml version="1.0" encoding="utf-8"?>
-<p:notes xmlns:a="http://schemas.openxmlformats.org/drawingml/2006/main" xmlns:r="http://schemas.openxmlformats.org/officeDocument/2006/relationships" xmlns:p="http://schemas.openxmlformats.org/presentationml/2006/main">
-  <p:cSld>
-    <p:spTree>
-      <p:nvGrpSpPr>
-        <p:cNvPr id="1" name=""/>
-        <p:cNvGrpSpPr/>
-        <p:nvPr/>
-      </p:nvGrpSpPr>
-      <p:grpSpPr>
-        <a:xfrm>
-          <a:off x="0" y="0"/>
-          <a:ext cx="0" cy="0"/>
-          <a:chOff x="0" y="0"/>
-          <a:chExt cx="0" cy="0"/>
-        </a:xfrm>
-      </p:grpSpPr>
-      <p:sp>
-        <p:nvSpPr>
-          <p:cNvPr id="2" name="Slide Image Placeholder 1"/>
-          <p:cNvSpPr>
-            <a:spLocks noGrp="1" noRot="1" noChangeAspect="1"/>
-          </p:cNvSpPr>
-          <p:nvPr>
-            <p:ph type="sldImg"/>
-          </p:nvPr>
-        </p:nvSpPr>
-        <p:spPr>
-          <a:xfrm>
-            <a:off x="-457200" y="3048000"/>
-            <a:ext cx="14630400" cy="8229600"/>
-          </a:xfrm>
-          <a:prstGeom prst="rect">
-            <a:avLst/>
-          </a:prstGeom>
-          <a:noFill/>
-          <a:ln w="12700">
-            <a:solidFill>
-              <a:prstClr val="black"/>
-            </a:solidFill>
-          </a:ln>
-        </p:spPr>
-      </p:sp>
-      <p:sp>
-        <p:nvSpPr>
-          <p:cNvPr id="3" name="Notes Placeholder 2"/>
-          <p:cNvSpPr>
-            <a:spLocks noGrp="1"/>
-          </p:cNvSpPr>
-          <p:nvPr>
-            <p:ph type="body" idx="1"/>
-          </p:nvPr>
-        </p:nvSpPr>
-        <p:spPr>
-          <a:xfrm>
-            <a:off x="1371600" y="11734800"/>
-            <a:ext cx="10972800" cy="9601200"/>
-          </a:xfrm>
-          <a:prstGeom prst="rect">
-            <a:avLst/>
-          </a:prstGeom>
-        </p:spPr>
-        <p:txBody>
-          <a:bodyPr/>
-          <a:lstStyle/>
-          <a:p>
-            <a:endParaRPr lang="en-US" dirty="0"/>
-          </a:p>
-        </p:txBody>
-      </p:sp>
-    </p:spTree>
-    <p:extLst>
-      <p:ext uri="{BB962C8B-B14F-4D97-AF65-F5344CB8AC3E}">
-        <p14:creationId xmlns:p14="http://schemas.microsoft.com/office/powerpoint/2010/main" val="2508814883"/>
-      </p:ext>
-    </p:extLst>
-  </p:cSld>
-  <p:clrMapOvr>
-    <a:masterClrMapping/>
-  </p:clrMapOvr>
-</p:notes>
-</file>
-
-<file path=ppt/notesSlides/notesSlide13.xml><?xml version="1.0" encoding="utf-8"?>
-<p:notes xmlns:a="http://schemas.openxmlformats.org/drawingml/2006/main" xmlns:r="http://schemas.openxmlformats.org/officeDocument/2006/relationships" xmlns:p="http://schemas.openxmlformats.org/presentationml/2006/main">
-  <p:cSld>
-    <p:spTree>
-      <p:nvGrpSpPr>
-        <p:cNvPr id="1" name=""/>
-        <p:cNvGrpSpPr/>
-        <p:nvPr/>
-      </p:nvGrpSpPr>
-      <p:grpSpPr>
-        <a:xfrm>
-          <a:off x="0" y="0"/>
-          <a:ext cx="0" cy="0"/>
-          <a:chOff x="0" y="0"/>
-          <a:chExt cx="0" cy="0"/>
-        </a:xfrm>
-      </p:grpSpPr>
-      <p:sp>
-        <p:nvSpPr>
-          <p:cNvPr id="2" name="Slide Image Placeholder 1"/>
-          <p:cNvSpPr>
-            <a:spLocks noGrp="1" noRot="1" noChangeAspect="1"/>
-          </p:cNvSpPr>
-          <p:nvPr>
-            <p:ph type="sldImg"/>
-          </p:nvPr>
-        </p:nvSpPr>
-        <p:spPr>
-          <a:xfrm>
-            <a:off x="-457200" y="3048000"/>
-            <a:ext cx="14630400" cy="8229600"/>
-          </a:xfrm>
-          <a:prstGeom prst="rect">
-            <a:avLst/>
-          </a:prstGeom>
-          <a:noFill/>
-          <a:ln w="12700">
-            <a:solidFill>
-              <a:prstClr val="black"/>
-            </a:solidFill>
-          </a:ln>
-        </p:spPr>
-      </p:sp>
-      <p:sp>
-        <p:nvSpPr>
-          <p:cNvPr id="3" name="Notes Placeholder 2"/>
-          <p:cNvSpPr>
-            <a:spLocks noGrp="1"/>
-          </p:cNvSpPr>
-          <p:nvPr>
-            <p:ph type="body" idx="1"/>
-          </p:nvPr>
-        </p:nvSpPr>
-        <p:spPr>
-          <a:xfrm>
-            <a:off x="1371600" y="11734800"/>
-            <a:ext cx="10972800" cy="9601200"/>
-          </a:xfrm>
-          <a:prstGeom prst="rect">
-            <a:avLst/>
-          </a:prstGeom>
-        </p:spPr>
-        <p:txBody>
-          <a:bodyPr/>
-          <a:lstStyle/>
-          <a:p>
-            <a:endParaRPr lang="en-US" dirty="0"/>
-          </a:p>
-        </p:txBody>
-      </p:sp>
-    </p:spTree>
-    <p:extLst>
-      <p:ext uri="{BB962C8B-B14F-4D97-AF65-F5344CB8AC3E}">
-        <p14:creationId xmlns:p14="http://schemas.microsoft.com/office/powerpoint/2010/main" val="931307476"/>
-      </p:ext>
-    </p:extLst>
-  </p:cSld>
-  <p:clrMapOvr>
-    <a:masterClrMapping/>
-  </p:clrMapOvr>
-</p:notes>
-</file>
-
-<file path=ppt/notesSlides/notesSlide2.xml><?xml version="1.0" encoding="utf-8"?>
-<p:notes xmlns:a="http://schemas.openxmlformats.org/drawingml/2006/main" xmlns:r="http://schemas.openxmlformats.org/officeDocument/2006/relationships" xmlns:p="http://schemas.openxmlformats.org/presentationml/2006/main">
-  <p:cSld>
-    <p:spTree>
-      <p:nvGrpSpPr>
-        <p:cNvPr id="1" name=""/>
-        <p:cNvGrpSpPr/>
-        <p:nvPr/>
-      </p:nvGrpSpPr>
-      <p:grpSpPr>
-        <a:xfrm>
-          <a:off x="0" y="0"/>
-          <a:ext cx="0" cy="0"/>
-          <a:chOff x="0" y="0"/>
-          <a:chExt cx="0" cy="0"/>
-        </a:xfrm>
-      </p:grpSpPr>
-      <p:sp>
-        <p:nvSpPr>
-          <p:cNvPr id="2" name="Slide Image Placeholder 1"/>
-          <p:cNvSpPr>
-            <a:spLocks noGrp="1" noRot="1" noChangeAspect="1"/>
-          </p:cNvSpPr>
-          <p:nvPr>
-            <p:ph type="sldImg"/>
-          </p:nvPr>
-        </p:nvSpPr>
-        <p:spPr>
-          <a:xfrm>
-            <a:off x="-457200" y="3048000"/>
-            <a:ext cx="14630400" cy="8229600"/>
-          </a:xfrm>
-          <a:prstGeom prst="rect">
-            <a:avLst/>
-          </a:prstGeom>
-          <a:noFill/>
-          <a:ln w="12700">
-            <a:solidFill>
-              <a:prstClr val="black"/>
-            </a:solidFill>
-          </a:ln>
-        </p:spPr>
-      </p:sp>
-      <p:sp>
-        <p:nvSpPr>
-          <p:cNvPr id="3" name="Notes Placeholder 2"/>
-          <p:cNvSpPr>
-            <a:spLocks noGrp="1"/>
-          </p:cNvSpPr>
-          <p:nvPr>
-            <p:ph type="body" idx="1"/>
-          </p:nvPr>
-        </p:nvSpPr>
-        <p:spPr>
-          <a:xfrm>
-            <a:off x="1371600" y="11734800"/>
-            <a:ext cx="10972800" cy="9601200"/>
-          </a:xfrm>
-          <a:prstGeom prst="rect">
-            <a:avLst/>
-          </a:prstGeom>
-        </p:spPr>
-        <p:txBody>
-          <a:bodyPr/>
-          <a:lstStyle/>
-          <a:p>
-            <a:endParaRPr lang="en-US" dirty="0"/>
-          </a:p>
-        </p:txBody>
-      </p:sp>
-    </p:spTree>
-    <p:extLst>
-      <p:ext uri="{BB962C8B-B14F-4D97-AF65-F5344CB8AC3E}">
-        <p14:creationId xmlns:p14="http://schemas.microsoft.com/office/powerpoint/2010/main" val="587736169"/>
-      </p:ext>
-    </p:extLst>
-  </p:cSld>
-  <p:clrMapOvr>
-    <a:masterClrMapping/>
-  </p:clrMapOvr>
-</p:notes>
-</file>
-
-<file path=ppt/notesSlides/notesSlide3.xml><?xml version="1.0" encoding="utf-8"?>
-<p:notes xmlns:a="http://schemas.openxmlformats.org/drawingml/2006/main" xmlns:r="http://schemas.openxmlformats.org/officeDocument/2006/relationships" xmlns:p="http://schemas.openxmlformats.org/presentationml/2006/main">
-  <p:cSld>
-    <p:spTree>
-      <p:nvGrpSpPr>
-        <p:cNvPr id="1" name=""/>
-        <p:cNvGrpSpPr/>
-        <p:nvPr/>
-      </p:nvGrpSpPr>
-      <p:grpSpPr>
-        <a:xfrm>
-          <a:off x="0" y="0"/>
-          <a:ext cx="0" cy="0"/>
-          <a:chOff x="0" y="0"/>
-          <a:chExt cx="0" cy="0"/>
-        </a:xfrm>
-      </p:grpSpPr>
-      <p:sp>
-        <p:nvSpPr>
-          <p:cNvPr id="2" name="Slide Image Placeholder 1"/>
-          <p:cNvSpPr>
-            <a:spLocks noGrp="1" noRot="1" noChangeAspect="1"/>
-          </p:cNvSpPr>
-          <p:nvPr>
-            <p:ph type="sldImg"/>
-          </p:nvPr>
-        </p:nvSpPr>
-        <p:spPr>
-          <a:xfrm>
-            <a:off x="-457200" y="3048000"/>
-            <a:ext cx="14630400" cy="8229600"/>
-          </a:xfrm>
-          <a:prstGeom prst="rect">
-            <a:avLst/>
-          </a:prstGeom>
-          <a:noFill/>
-          <a:ln w="12700">
-            <a:solidFill>
-              <a:prstClr val="black"/>
-            </a:solidFill>
-          </a:ln>
-        </p:spPr>
-      </p:sp>
-      <p:sp>
-        <p:nvSpPr>
-          <p:cNvPr id="3" name="Notes Placeholder 2"/>
-          <p:cNvSpPr>
-            <a:spLocks noGrp="1"/>
-          </p:cNvSpPr>
-          <p:nvPr>
-            <p:ph type="body" idx="1"/>
-          </p:nvPr>
-        </p:nvSpPr>
-        <p:spPr>
-          <a:xfrm>
-            <a:off x="1371600" y="11734800"/>
-            <a:ext cx="10972800" cy="9601200"/>
-          </a:xfrm>
-          <a:prstGeom prst="rect">
-            <a:avLst/>
-          </a:prstGeom>
-        </p:spPr>
-        <p:txBody>
-          <a:bodyPr/>
-          <a:lstStyle/>
-          <a:p>
-            <a:endParaRPr lang="en-US" dirty="0"/>
-          </a:p>
-        </p:txBody>
-      </p:sp>
-    </p:spTree>
-    <p:extLst>
-      <p:ext uri="{BB962C8B-B14F-4D97-AF65-F5344CB8AC3E}">
-        <p14:creationId xmlns:p14="http://schemas.microsoft.com/office/powerpoint/2010/main" val="3294931275"/>
-      </p:ext>
-    </p:extLst>
-  </p:cSld>
-  <p:clrMapOvr>
-    <a:masterClrMapping/>
-  </p:clrMapOvr>
-</p:notes>
-</file>
-
-<file path=ppt/notesSlides/notesSlide4.xml><?xml version="1.0" encoding="utf-8"?>
-<p:notes xmlns:a="http://schemas.openxmlformats.org/drawingml/2006/main" xmlns:r="http://schemas.openxmlformats.org/officeDocument/2006/relationships" xmlns:p="http://schemas.openxmlformats.org/presentationml/2006/main">
-  <p:cSld>
-    <p:spTree>
-      <p:nvGrpSpPr>
-        <p:cNvPr id="1" name=""/>
-        <p:cNvGrpSpPr/>
-        <p:nvPr/>
-      </p:nvGrpSpPr>
-      <p:grpSpPr>
-        <a:xfrm>
-          <a:off x="0" y="0"/>
-          <a:ext cx="0" cy="0"/>
-          <a:chOff x="0" y="0"/>
-          <a:chExt cx="0" cy="0"/>
-        </a:xfrm>
-      </p:grpSpPr>
-      <p:sp>
-        <p:nvSpPr>
-          <p:cNvPr id="2" name="Slide Image Placeholder 1"/>
-          <p:cNvSpPr>
-            <a:spLocks noGrp="1" noRot="1" noChangeAspect="1"/>
-          </p:cNvSpPr>
-          <p:nvPr>
-            <p:ph type="sldImg"/>
-          </p:nvPr>
-        </p:nvSpPr>
-        <p:spPr>
-          <a:xfrm>
-            <a:off x="-457200" y="3048000"/>
-            <a:ext cx="14630400" cy="8229600"/>
-          </a:xfrm>
-          <a:prstGeom prst="rect">
-            <a:avLst/>
-          </a:prstGeom>
-          <a:noFill/>
-          <a:ln w="12700">
-            <a:solidFill>
-              <a:prstClr val="black"/>
-            </a:solidFill>
-          </a:ln>
-        </p:spPr>
-      </p:sp>
-      <p:sp>
-        <p:nvSpPr>
-          <p:cNvPr id="3" name="Notes Placeholder 2"/>
-          <p:cNvSpPr>
-            <a:spLocks noGrp="1"/>
-          </p:cNvSpPr>
-          <p:nvPr>
-            <p:ph type="body" idx="1"/>
-          </p:nvPr>
-        </p:nvSpPr>
-        <p:spPr>
-          <a:xfrm>
-            <a:off x="1371600" y="11734800"/>
-            <a:ext cx="10972800" cy="9601200"/>
-          </a:xfrm>
-          <a:prstGeom prst="rect">
-            <a:avLst/>
-          </a:prstGeom>
-        </p:spPr>
-        <p:txBody>
-          <a:bodyPr/>
-          <a:lstStyle/>
-          <a:p>
-            <a:endParaRPr lang="en-US" dirty="0"/>
-          </a:p>
-        </p:txBody>
-      </p:sp>
-    </p:spTree>
-    <p:extLst>
-      <p:ext uri="{BB962C8B-B14F-4D97-AF65-F5344CB8AC3E}">
-        <p14:creationId xmlns:p14="http://schemas.microsoft.com/office/powerpoint/2010/main" val="3068653063"/>
-      </p:ext>
-    </p:extLst>
-  </p:cSld>
-  <p:clrMapOvr>
-    <a:masterClrMapping/>
-  </p:clrMapOvr>
-</p:notes>
-</file>
-
-<file path=ppt/notesSlides/notesSlide5.xml><?xml version="1.0" encoding="utf-8"?>
-<p:notes xmlns:a="http://schemas.openxmlformats.org/drawingml/2006/main" xmlns:r="http://schemas.openxmlformats.org/officeDocument/2006/relationships" xmlns:p="http://schemas.openxmlformats.org/presentationml/2006/main">
-  <p:cSld>
-    <p:spTree>
-      <p:nvGrpSpPr>
-        <p:cNvPr id="1" name=""/>
-        <p:cNvGrpSpPr/>
-        <p:nvPr/>
-      </p:nvGrpSpPr>
-      <p:grpSpPr>
-        <a:xfrm>
-          <a:off x="0" y="0"/>
-          <a:ext cx="0" cy="0"/>
-          <a:chOff x="0" y="0"/>
-          <a:chExt cx="0" cy="0"/>
-        </a:xfrm>
-      </p:grpSpPr>
-      <p:sp>
-        <p:nvSpPr>
-          <p:cNvPr id="2" name="Slide Image Placeholder 1"/>
-          <p:cNvSpPr>
-            <a:spLocks noGrp="1" noRot="1" noChangeAspect="1"/>
-          </p:cNvSpPr>
-          <p:nvPr>
-            <p:ph type="sldImg"/>
-          </p:nvPr>
-        </p:nvSpPr>
-        <p:spPr>
-          <a:xfrm>
-            <a:off x="-457200" y="3048000"/>
-            <a:ext cx="14630400" cy="8229600"/>
-          </a:xfrm>
-          <a:prstGeom prst="rect">
-            <a:avLst/>
-          </a:prstGeom>
-          <a:noFill/>
-          <a:ln w="12700">
-            <a:solidFill>
-              <a:prstClr val="black"/>
-            </a:solidFill>
-          </a:ln>
-        </p:spPr>
-      </p:sp>
-      <p:sp>
-        <p:nvSpPr>
-          <p:cNvPr id="3" name="Notes Placeholder 2"/>
-          <p:cNvSpPr>
-            <a:spLocks noGrp="1"/>
-          </p:cNvSpPr>
-          <p:nvPr>
-            <p:ph type="body" idx="1"/>
-          </p:nvPr>
-        </p:nvSpPr>
-        <p:spPr>
-          <a:xfrm>
-            <a:off x="1371600" y="11734800"/>
-            <a:ext cx="10972800" cy="9601200"/>
-          </a:xfrm>
-          <a:prstGeom prst="rect">
-            <a:avLst/>
-          </a:prstGeom>
-        </p:spPr>
-        <p:txBody>
-          <a:bodyPr/>
-          <a:lstStyle/>
-          <a:p>
-            <a:endParaRPr lang="en-US" dirty="0"/>
-          </a:p>
-        </p:txBody>
-      </p:sp>
-    </p:spTree>
-    <p:extLst>
-      <p:ext uri="{BB962C8B-B14F-4D97-AF65-F5344CB8AC3E}">
-        <p14:creationId xmlns:p14="http://schemas.microsoft.com/office/powerpoint/2010/main" val="1019397722"/>
-      </p:ext>
-    </p:extLst>
-  </p:cSld>
-  <p:clrMapOvr>
-    <a:masterClrMapping/>
-  </p:clrMapOvr>
-</p:notes>
-</file>
-
-<file path=ppt/notesSlides/notesSlide6.xml><?xml version="1.0" encoding="utf-8"?>
-<p:notes xmlns:a="http://schemas.openxmlformats.org/drawingml/2006/main" xmlns:r="http://schemas.openxmlformats.org/officeDocument/2006/relationships" xmlns:p="http://schemas.openxmlformats.org/presentationml/2006/main">
-  <p:cSld>
-    <p:spTree>
-      <p:nvGrpSpPr>
-        <p:cNvPr id="1" name=""/>
-        <p:cNvGrpSpPr/>
-        <p:nvPr/>
-      </p:nvGrpSpPr>
-      <p:grpSpPr>
-        <a:xfrm>
-          <a:off x="0" y="0"/>
-          <a:ext cx="0" cy="0"/>
-          <a:chOff x="0" y="0"/>
-          <a:chExt cx="0" cy="0"/>
-        </a:xfrm>
-      </p:grpSpPr>
-      <p:sp>
-        <p:nvSpPr>
-          <p:cNvPr id="2" name="Slide Image Placeholder 1"/>
-          <p:cNvSpPr>
-            <a:spLocks noGrp="1" noRot="1" noChangeAspect="1"/>
-          </p:cNvSpPr>
-          <p:nvPr>
-            <p:ph type="sldImg"/>
-          </p:nvPr>
-        </p:nvSpPr>
-        <p:spPr>
-          <a:xfrm>
-            <a:off x="-457200" y="3048000"/>
-            <a:ext cx="14630400" cy="8229600"/>
-          </a:xfrm>
-          <a:prstGeom prst="rect">
-            <a:avLst/>
-          </a:prstGeom>
-          <a:noFill/>
-          <a:ln w="12700">
-            <a:solidFill>
-              <a:prstClr val="black"/>
-            </a:solidFill>
-          </a:ln>
-        </p:spPr>
-      </p:sp>
-      <p:sp>
-        <p:nvSpPr>
-          <p:cNvPr id="3" name="Notes Placeholder 2"/>
-          <p:cNvSpPr>
-            <a:spLocks noGrp="1"/>
-          </p:cNvSpPr>
-          <p:nvPr>
-            <p:ph type="body" idx="1"/>
-          </p:nvPr>
-        </p:nvSpPr>
-        <p:spPr>
-          <a:xfrm>
-            <a:off x="1371600" y="11734800"/>
-            <a:ext cx="10972800" cy="9601200"/>
-          </a:xfrm>
-          <a:prstGeom prst="rect">
-            <a:avLst/>
-          </a:prstGeom>
-        </p:spPr>
-        <p:txBody>
-          <a:bodyPr/>
-          <a:lstStyle/>
-          <a:p>
-            <a:endParaRPr lang="en-US" dirty="0"/>
-          </a:p>
-        </p:txBody>
-      </p:sp>
-    </p:spTree>
-    <p:extLst>
-      <p:ext uri="{BB962C8B-B14F-4D97-AF65-F5344CB8AC3E}">
-        <p14:creationId xmlns:p14="http://schemas.microsoft.com/office/powerpoint/2010/main" val="87667087"/>
-      </p:ext>
-    </p:extLst>
-  </p:cSld>
-  <p:clrMapOvr>
-    <a:masterClrMapping/>
-  </p:clrMapOvr>
-</p:notes>
-</file>
-
-<file path=ppt/notesSlides/notesSlide7.xml><?xml version="1.0" encoding="utf-8"?>
-<p:notes xmlns:a="http://schemas.openxmlformats.org/drawingml/2006/main" xmlns:r="http://schemas.openxmlformats.org/officeDocument/2006/relationships" xmlns:p="http://schemas.openxmlformats.org/presentationml/2006/main">
-  <p:cSld>
-    <p:spTree>
-      <p:nvGrpSpPr>
-        <p:cNvPr id="1" name=""/>
-        <p:cNvGrpSpPr/>
-        <p:nvPr/>
-      </p:nvGrpSpPr>
-      <p:grpSpPr>
-        <a:xfrm>
-          <a:off x="0" y="0"/>
-          <a:ext cx="0" cy="0"/>
-          <a:chOff x="0" y="0"/>
-          <a:chExt cx="0" cy="0"/>
-        </a:xfrm>
-      </p:grpSpPr>
-      <p:sp>
-        <p:nvSpPr>
-          <p:cNvPr id="2" name="Slide Image Placeholder 1"/>
-          <p:cNvSpPr>
-            <a:spLocks noGrp="1" noRot="1" noChangeAspect="1"/>
-          </p:cNvSpPr>
-          <p:nvPr>
-            <p:ph type="sldImg"/>
-          </p:nvPr>
-        </p:nvSpPr>
-        <p:spPr>
-          <a:xfrm>
-            <a:off x="-457200" y="3048000"/>
-            <a:ext cx="14630400" cy="8229600"/>
-          </a:xfrm>
-          <a:prstGeom prst="rect">
-            <a:avLst/>
-          </a:prstGeom>
-          <a:noFill/>
-          <a:ln w="12700">
-            <a:solidFill>
-              <a:prstClr val="black"/>
-            </a:solidFill>
-          </a:ln>
-        </p:spPr>
-      </p:sp>
-      <p:sp>
-        <p:nvSpPr>
-          <p:cNvPr id="3" name="Notes Placeholder 2"/>
-          <p:cNvSpPr>
-            <a:spLocks noGrp="1"/>
-          </p:cNvSpPr>
-          <p:nvPr>
-            <p:ph type="body" idx="1"/>
-          </p:nvPr>
-        </p:nvSpPr>
-        <p:spPr>
-          <a:xfrm>
-            <a:off x="1371600" y="11734800"/>
-            <a:ext cx="10972800" cy="9601200"/>
-          </a:xfrm>
-          <a:prstGeom prst="rect">
-            <a:avLst/>
-          </a:prstGeom>
-        </p:spPr>
-        <p:txBody>
-          <a:bodyPr/>
-          <a:lstStyle/>
-          <a:p>
-            <a:endParaRPr lang="en-US" dirty="0"/>
-          </a:p>
-        </p:txBody>
-      </p:sp>
-    </p:spTree>
-    <p:extLst>
-      <p:ext uri="{BB962C8B-B14F-4D97-AF65-F5344CB8AC3E}">
-        <p14:creationId xmlns:p14="http://schemas.microsoft.com/office/powerpoint/2010/main" val="1649742202"/>
-      </p:ext>
-    </p:extLst>
-  </p:cSld>
-  <p:clrMapOvr>
-    <a:masterClrMapping/>
-  </p:clrMapOvr>
-</p:notes>
-</file>
-
-<file path=ppt/notesSlides/notesSlide8.xml><?xml version="1.0" encoding="utf-8"?>
-<p:notes xmlns:a="http://schemas.openxmlformats.org/drawingml/2006/main" xmlns:r="http://schemas.openxmlformats.org/officeDocument/2006/relationships" xmlns:p="http://schemas.openxmlformats.org/presentationml/2006/main">
-  <p:cSld>
-    <p:spTree>
-      <p:nvGrpSpPr>
-        <p:cNvPr id="1" name=""/>
-        <p:cNvGrpSpPr/>
-        <p:nvPr/>
-      </p:nvGrpSpPr>
-      <p:grpSpPr>
-        <a:xfrm>
-          <a:off x="0" y="0"/>
-          <a:ext cx="0" cy="0"/>
-          <a:chOff x="0" y="0"/>
-          <a:chExt cx="0" cy="0"/>
-        </a:xfrm>
-      </p:grpSpPr>
-      <p:sp>
-        <p:nvSpPr>
-          <p:cNvPr id="2" name="Slide Image Placeholder 1"/>
-          <p:cNvSpPr>
-            <a:spLocks noGrp="1" noRot="1" noChangeAspect="1"/>
-          </p:cNvSpPr>
-          <p:nvPr>
-            <p:ph type="sldImg"/>
-          </p:nvPr>
-        </p:nvSpPr>
-        <p:spPr>
-          <a:xfrm>
-            <a:off x="-457200" y="3048000"/>
-            <a:ext cx="14630400" cy="8229600"/>
-          </a:xfrm>
-          <a:prstGeom prst="rect">
-            <a:avLst/>
-          </a:prstGeom>
-          <a:noFill/>
-          <a:ln w="12700">
-            <a:solidFill>
-              <a:prstClr val="black"/>
-            </a:solidFill>
-          </a:ln>
-        </p:spPr>
-      </p:sp>
-      <p:sp>
-        <p:nvSpPr>
-          <p:cNvPr id="3" name="Notes Placeholder 2"/>
-          <p:cNvSpPr>
-            <a:spLocks noGrp="1"/>
-          </p:cNvSpPr>
-          <p:nvPr>
-            <p:ph type="body" idx="1"/>
-          </p:nvPr>
-        </p:nvSpPr>
-        <p:spPr>
-          <a:xfrm>
-            <a:off x="1371600" y="11734800"/>
-            <a:ext cx="10972800" cy="9601200"/>
-          </a:xfrm>
-          <a:prstGeom prst="rect">
-            <a:avLst/>
-          </a:prstGeom>
-        </p:spPr>
-        <p:txBody>
-          <a:bodyPr/>
-          <a:lstStyle/>
-          <a:p>
-            <a:endParaRPr lang="en-US" dirty="0"/>
-          </a:p>
-        </p:txBody>
-      </p:sp>
-    </p:spTree>
-    <p:extLst>
-      <p:ext uri="{BB962C8B-B14F-4D97-AF65-F5344CB8AC3E}">
-        <p14:creationId xmlns:p14="http://schemas.microsoft.com/office/powerpoint/2010/main" val="177914689"/>
-      </p:ext>
-    </p:extLst>
-  </p:cSld>
-  <p:clrMapOvr>
-    <a:masterClrMapping/>
-  </p:clrMapOvr>
-</p:notes>
-</file>
-
-<file path=ppt/notesSlides/notesSlide9.xml><?xml version="1.0" encoding="utf-8"?>
-<p:notes xmlns:a="http://schemas.openxmlformats.org/drawingml/2006/main" xmlns:r="http://schemas.openxmlformats.org/officeDocument/2006/relationships" xmlns:p="http://schemas.openxmlformats.org/presentationml/2006/main">
-  <p:cSld>
-    <p:spTree>
-      <p:nvGrpSpPr>
-        <p:cNvPr id="1" name=""/>
-        <p:cNvGrpSpPr/>
-        <p:nvPr/>
-      </p:nvGrpSpPr>
-      <p:grpSpPr>
-        <a:xfrm>
-          <a:off x="0" y="0"/>
-          <a:ext cx="0" cy="0"/>
-          <a:chOff x="0" y="0"/>
-          <a:chExt cx="0" cy="0"/>
-        </a:xfrm>
-      </p:grpSpPr>
-      <p:sp>
-        <p:nvSpPr>
-          <p:cNvPr id="2" name="Slide Image Placeholder 1"/>
-          <p:cNvSpPr>
-            <a:spLocks noGrp="1" noRot="1" noChangeAspect="1"/>
-          </p:cNvSpPr>
-          <p:nvPr>
-            <p:ph type="sldImg"/>
-          </p:nvPr>
-        </p:nvSpPr>
-        <p:spPr>
-          <a:xfrm>
-            <a:off x="-457200" y="3048000"/>
-            <a:ext cx="14630400" cy="8229600"/>
-          </a:xfrm>
-          <a:prstGeom prst="rect">
-            <a:avLst/>
-          </a:prstGeom>
-          <a:noFill/>
-          <a:ln w="12700">
-            <a:solidFill>
-              <a:prstClr val="black"/>
-            </a:solidFill>
-          </a:ln>
-        </p:spPr>
-      </p:sp>
-      <p:sp>
-        <p:nvSpPr>
-          <p:cNvPr id="3" name="Notes Placeholder 2"/>
-          <p:cNvSpPr>
-            <a:spLocks noGrp="1"/>
-          </p:cNvSpPr>
-          <p:nvPr>
-            <p:ph type="body" idx="1"/>
-          </p:nvPr>
-        </p:nvSpPr>
-        <p:spPr>
-          <a:xfrm>
-            <a:off x="1371600" y="11734800"/>
-            <a:ext cx="10972800" cy="9601200"/>
-          </a:xfrm>
-          <a:prstGeom prst="rect">
-            <a:avLst/>
-          </a:prstGeom>
-        </p:spPr>
-        <p:txBody>
-          <a:bodyPr/>
-          <a:lstStyle/>
-          <a:p>
-            <a:endParaRPr lang="en-US" dirty="0"/>
-          </a:p>
-        </p:txBody>
-      </p:sp>
-    </p:spTree>
-    <p:extLst>
-      <p:ext uri="{BB962C8B-B14F-4D97-AF65-F5344CB8AC3E}">
-        <p14:creationId xmlns:p14="http://schemas.microsoft.com/office/powerpoint/2010/main" val="984541709"/>
       </p:ext>
     </p:extLst>
   </p:cSld>
@@ -17858,1532 +16853,6 @@
 </p:sld>
 </file>
 
-<file path=ppt/slides/slide10.xml><?xml version="1.0" encoding="utf-8"?>
-<p:sld xmlns:a="http://schemas.openxmlformats.org/drawingml/2006/main" xmlns:r="http://schemas.openxmlformats.org/officeDocument/2006/relationships" xmlns:p="http://schemas.openxmlformats.org/presentationml/2006/main">
-  <p:cSld>
-    <p:spTree>
-      <p:nvGrpSpPr>
-        <p:cNvPr id="1" name=""/>
-        <p:cNvGrpSpPr/>
-        <p:nvPr/>
-      </p:nvGrpSpPr>
-      <p:grpSpPr>
-        <a:xfrm>
-          <a:off x="0" y="0"/>
-          <a:ext cx="0" cy="0"/>
-          <a:chOff x="0" y="0"/>
-          <a:chExt cx="0" cy="0"/>
-        </a:xfrm>
-      </p:grpSpPr>
-      <p:sp>
-        <p:nvSpPr>
-          <p:cNvPr id="5" name="Title 4">
-            <a:extLst>
-              <a:ext uri="{FF2B5EF4-FFF2-40B4-BE49-F238E27FC236}">
-                <a16:creationId xmlns:a16="http://schemas.microsoft.com/office/drawing/2014/main" id="{2136FCF6-982C-CC37-9625-3EBFC7E7DD13}"/>
-              </a:ext>
-            </a:extLst>
-          </p:cNvPr>
-          <p:cNvSpPr>
-            <a:spLocks noGrp="1"/>
-          </p:cNvSpPr>
-          <p:nvPr>
-            <p:ph type="title"/>
-          </p:nvPr>
-        </p:nvSpPr>
-        <p:spPr>
-          <a:xfrm>
-            <a:off x="1550563" y="1089213"/>
-            <a:ext cx="9879437" cy="980844"/>
-          </a:xfrm>
-        </p:spPr>
-        <p:txBody>
-          <a:bodyPr/>
-          <a:lstStyle/>
-          <a:p>
-            <a:r>
-              <a:rPr lang="en-US" dirty="0"/>
-              <a:t>Dynamic delivery</a:t>
-            </a:r>
-          </a:p>
-        </p:txBody>
-      </p:sp>
-      <p:sp>
-        <p:nvSpPr>
-          <p:cNvPr id="4" name="Text Placeholder 3">
-            <a:extLst>
-              <a:ext uri="{FF2B5EF4-FFF2-40B4-BE49-F238E27FC236}">
-                <a16:creationId xmlns:a16="http://schemas.microsoft.com/office/drawing/2014/main" id="{97DCC342-9FD1-7055-EAAC-008DC851B13F}"/>
-              </a:ext>
-            </a:extLst>
-          </p:cNvPr>
-          <p:cNvSpPr>
-            <a:spLocks noGrp="1"/>
-          </p:cNvSpPr>
-          <p:nvPr>
-            <p:ph type="body" sz="quarter" idx="13"/>
-          </p:nvPr>
-        </p:nvSpPr>
-        <p:spPr>
-          <a:xfrm>
-            <a:off x="1550564" y="2331958"/>
-            <a:ext cx="2975217" cy="3704266"/>
-          </a:xfrm>
-        </p:spPr>
-        <p:txBody>
-          <a:bodyPr/>
-          <a:lstStyle/>
-          <a:p>
-            <a:r>
-              <a:rPr lang="en-US" dirty="0"/>
-              <a:t>Learn to infuse energy into your delivery to leave a lasting impression</a:t>
-            </a:r>
-          </a:p>
-          <a:p>
-            <a:r>
-              <a:rPr lang="en-US" dirty="0"/>
-              <a:t>One of the goals of effective communication is to motivate your audience</a:t>
-            </a:r>
-          </a:p>
-        </p:txBody>
-      </p:sp>
-      <p:graphicFrame>
-        <p:nvGraphicFramePr>
-          <p:cNvPr id="6" name="Content Placeholder 5">
-            <a:extLst>
-              <a:ext uri="{FF2B5EF4-FFF2-40B4-BE49-F238E27FC236}">
-                <a16:creationId xmlns:a16="http://schemas.microsoft.com/office/drawing/2014/main" id="{4DB3991E-0605-C20E-53AD-D64E13638DA5}"/>
-              </a:ext>
-            </a:extLst>
-          </p:cNvPr>
-          <p:cNvGraphicFramePr>
-            <a:graphicFrameLocks noGrp="1"/>
-          </p:cNvGraphicFramePr>
-          <p:nvPr>
-            <p:ph sz="half" idx="1"/>
-            <p:extLst>
-              <p:ext uri="{D42A27DB-BD31-4B8C-83A1-F6EECF244321}">
-                <p14:modId xmlns:p14="http://schemas.microsoft.com/office/powerpoint/2010/main" val="2133818870"/>
-              </p:ext>
-            </p:extLst>
-          </p:nvPr>
-        </p:nvGraphicFramePr>
-        <p:xfrm>
-          <a:off x="5087938" y="2332038"/>
-          <a:ext cx="6345236" cy="3879279"/>
-        </p:xfrm>
-        <a:graphic>
-          <a:graphicData uri="http://schemas.openxmlformats.org/drawingml/2006/table">
-            <a:tbl>
-              <a:tblPr firstRow="1" bandRow="1">
-                <a:tableStyleId>{3B4B98B0-60AC-42C2-AFA5-B58CD77FA1E5}</a:tableStyleId>
-              </a:tblPr>
-              <a:tblGrid>
-                <a:gridCol w="2227408">
-                  <a:extLst>
-                    <a:ext uri="{9D8B030D-6E8A-4147-A177-3AD203B41FA5}">
-                      <a16:colId xmlns:a16="http://schemas.microsoft.com/office/drawing/2014/main" val="180956085"/>
-                    </a:ext>
-                  </a:extLst>
-                </a:gridCol>
-                <a:gridCol w="2227408">
-                  <a:extLst>
-                    <a:ext uri="{9D8B030D-6E8A-4147-A177-3AD203B41FA5}">
-                      <a16:colId xmlns:a16="http://schemas.microsoft.com/office/drawing/2014/main" val="1180706872"/>
-                    </a:ext>
-                  </a:extLst>
-                </a:gridCol>
-                <a:gridCol w="945210">
-                  <a:extLst>
-                    <a:ext uri="{9D8B030D-6E8A-4147-A177-3AD203B41FA5}">
-                      <a16:colId xmlns:a16="http://schemas.microsoft.com/office/drawing/2014/main" val="2050154702"/>
-                    </a:ext>
-                  </a:extLst>
-                </a:gridCol>
-                <a:gridCol w="945210">
-                  <a:extLst>
-                    <a:ext uri="{9D8B030D-6E8A-4147-A177-3AD203B41FA5}">
-                      <a16:colId xmlns:a16="http://schemas.microsoft.com/office/drawing/2014/main" val="1872764148"/>
-                    </a:ext>
-                  </a:extLst>
-                </a:gridCol>
-              </a:tblGrid>
-              <a:tr h="606129">
-                <a:tc>
-                  <a:txBody>
-                    <a:bodyPr/>
-                    <a:lstStyle/>
-                    <a:p>
-                      <a:r>
-                        <a:rPr lang="en-US" dirty="0">
-                          <a:solidFill>
-                            <a:schemeClr val="accent6"/>
-                          </a:solidFill>
-                        </a:rPr>
-                        <a:t>Metric</a:t>
-                      </a:r>
-                    </a:p>
-                  </a:txBody>
-                  <a:tcPr anchor="ctr"/>
-                </a:tc>
-                <a:tc>
-                  <a:txBody>
-                    <a:bodyPr/>
-                    <a:lstStyle/>
-                    <a:p>
-                      <a:r>
-                        <a:rPr lang="en-US" dirty="0">
-                          <a:solidFill>
-                            <a:schemeClr val="accent6"/>
-                          </a:solidFill>
-                        </a:rPr>
-                        <a:t>Measurement</a:t>
-                      </a:r>
-                    </a:p>
-                  </a:txBody>
-                  <a:tcPr anchor="ctr"/>
-                </a:tc>
-                <a:tc>
-                  <a:txBody>
-                    <a:bodyPr/>
-                    <a:lstStyle/>
-                    <a:p>
-                      <a:r>
-                        <a:rPr lang="en-US" dirty="0">
-                          <a:solidFill>
-                            <a:schemeClr val="accent6"/>
-                          </a:solidFill>
-                        </a:rPr>
-                        <a:t>Target</a:t>
-                      </a:r>
-                    </a:p>
-                  </a:txBody>
-                  <a:tcPr anchor="ctr"/>
-                </a:tc>
-                <a:tc>
-                  <a:txBody>
-                    <a:bodyPr/>
-                    <a:lstStyle/>
-                    <a:p>
-                      <a:r>
-                        <a:rPr lang="en-US" dirty="0">
-                          <a:solidFill>
-                            <a:schemeClr val="accent6"/>
-                          </a:solidFill>
-                        </a:rPr>
-                        <a:t>Actual</a:t>
-                      </a:r>
-                    </a:p>
-                  </a:txBody>
-                  <a:tcPr anchor="ctr"/>
-                </a:tc>
-                <a:extLst>
-                  <a:ext uri="{0D108BD9-81ED-4DB2-BD59-A6C34878D82A}">
-                    <a16:rowId xmlns:a16="http://schemas.microsoft.com/office/drawing/2014/main" val="3059142786"/>
-                  </a:ext>
-                </a:extLst>
-              </a:tr>
-              <a:tr h="606129">
-                <a:tc>
-                  <a:txBody>
-                    <a:bodyPr/>
-                    <a:lstStyle/>
-                    <a:p>
-                      <a:r>
-                        <a:rPr lang="en-US" dirty="0">
-                          <a:solidFill>
-                            <a:schemeClr val="accent6"/>
-                          </a:solidFill>
-                        </a:rPr>
-                        <a:t>Audience attendance</a:t>
-                      </a:r>
-                    </a:p>
-                  </a:txBody>
-                  <a:tcPr anchor="ctr"/>
-                </a:tc>
-                <a:tc>
-                  <a:txBody>
-                    <a:bodyPr/>
-                    <a:lstStyle/>
-                    <a:p>
-                      <a:r>
-                        <a:rPr lang="en-US" dirty="0">
-                          <a:solidFill>
-                            <a:schemeClr val="accent6"/>
-                          </a:solidFill>
-                        </a:rPr>
-                        <a:t># of attendees</a:t>
-                      </a:r>
-                    </a:p>
-                  </a:txBody>
-                  <a:tcPr anchor="ctr"/>
-                </a:tc>
-                <a:tc>
-                  <a:txBody>
-                    <a:bodyPr/>
-                    <a:lstStyle/>
-                    <a:p>
-                      <a:r>
-                        <a:rPr lang="en-US" dirty="0">
-                          <a:solidFill>
-                            <a:schemeClr val="accent6"/>
-                          </a:solidFill>
-                        </a:rPr>
-                        <a:t>150</a:t>
-                      </a:r>
-                    </a:p>
-                  </a:txBody>
-                  <a:tcPr anchor="ctr"/>
-                </a:tc>
-                <a:tc>
-                  <a:txBody>
-                    <a:bodyPr/>
-                    <a:lstStyle/>
-                    <a:p>
-                      <a:r>
-                        <a:rPr lang="en-US" dirty="0">
-                          <a:solidFill>
-                            <a:schemeClr val="accent6"/>
-                          </a:solidFill>
-                        </a:rPr>
-                        <a:t>120</a:t>
-                      </a:r>
-                    </a:p>
-                  </a:txBody>
-                  <a:tcPr anchor="ctr"/>
-                </a:tc>
-                <a:extLst>
-                  <a:ext uri="{0D108BD9-81ED-4DB2-BD59-A6C34878D82A}">
-                    <a16:rowId xmlns:a16="http://schemas.microsoft.com/office/drawing/2014/main" val="3588576737"/>
-                  </a:ext>
-                </a:extLst>
-              </a:tr>
-              <a:tr h="643498">
-                <a:tc>
-                  <a:txBody>
-                    <a:bodyPr/>
-                    <a:lstStyle/>
-                    <a:p>
-                      <a:r>
-                        <a:rPr lang="en-US" dirty="0">
-                          <a:solidFill>
-                            <a:schemeClr val="accent6"/>
-                          </a:solidFill>
-                        </a:rPr>
-                        <a:t>Engagement duration</a:t>
-                      </a:r>
-                    </a:p>
-                  </a:txBody>
-                  <a:tcPr anchor="ctr"/>
-                </a:tc>
-                <a:tc>
-                  <a:txBody>
-                    <a:bodyPr/>
-                    <a:lstStyle/>
-                    <a:p>
-                      <a:r>
-                        <a:rPr lang="en-US" dirty="0">
-                          <a:solidFill>
-                            <a:schemeClr val="accent6"/>
-                          </a:solidFill>
-                        </a:rPr>
-                        <a:t>Minutes</a:t>
-                      </a:r>
-                    </a:p>
-                  </a:txBody>
-                  <a:tcPr anchor="ctr"/>
-                </a:tc>
-                <a:tc>
-                  <a:txBody>
-                    <a:bodyPr/>
-                    <a:lstStyle/>
-                    <a:p>
-                      <a:r>
-                        <a:rPr lang="en-US" dirty="0">
-                          <a:solidFill>
-                            <a:schemeClr val="accent6"/>
-                          </a:solidFill>
-                        </a:rPr>
-                        <a:t>60</a:t>
-                      </a:r>
-                    </a:p>
-                  </a:txBody>
-                  <a:tcPr anchor="ctr"/>
-                </a:tc>
-                <a:tc>
-                  <a:txBody>
-                    <a:bodyPr/>
-                    <a:lstStyle/>
-                    <a:p>
-                      <a:r>
-                        <a:rPr lang="en-US" dirty="0">
-                          <a:solidFill>
-                            <a:schemeClr val="accent6"/>
-                          </a:solidFill>
-                        </a:rPr>
-                        <a:t>75</a:t>
-                      </a:r>
-                    </a:p>
-                  </a:txBody>
-                  <a:tcPr anchor="ctr"/>
-                </a:tc>
-                <a:extLst>
-                  <a:ext uri="{0D108BD9-81ED-4DB2-BD59-A6C34878D82A}">
-                    <a16:rowId xmlns:a16="http://schemas.microsoft.com/office/drawing/2014/main" val="1626410507"/>
-                  </a:ext>
-                </a:extLst>
-              </a:tr>
-              <a:tr h="606129">
-                <a:tc>
-                  <a:txBody>
-                    <a:bodyPr/>
-                    <a:lstStyle/>
-                    <a:p>
-                      <a:r>
-                        <a:rPr lang="en-US" dirty="0">
-                          <a:solidFill>
-                            <a:schemeClr val="accent6"/>
-                          </a:solidFill>
-                        </a:rPr>
-                        <a:t>Q&amp;A interaction</a:t>
-                      </a:r>
-                    </a:p>
-                  </a:txBody>
-                  <a:tcPr anchor="ctr"/>
-                </a:tc>
-                <a:tc>
-                  <a:txBody>
-                    <a:bodyPr/>
-                    <a:lstStyle/>
-                    <a:p>
-                      <a:r>
-                        <a:rPr lang="en-US" dirty="0">
-                          <a:solidFill>
-                            <a:schemeClr val="accent6"/>
-                          </a:solidFill>
-                        </a:rPr>
-                        <a:t># of questions</a:t>
-                      </a:r>
-                    </a:p>
-                  </a:txBody>
-                  <a:tcPr anchor="ctr"/>
-                </a:tc>
-                <a:tc>
-                  <a:txBody>
-                    <a:bodyPr/>
-                    <a:lstStyle/>
-                    <a:p>
-                      <a:r>
-                        <a:rPr lang="en-US" dirty="0">
-                          <a:solidFill>
-                            <a:schemeClr val="accent6"/>
-                          </a:solidFill>
-                        </a:rPr>
-                        <a:t>10</a:t>
-                      </a:r>
-                    </a:p>
-                  </a:txBody>
-                  <a:tcPr anchor="ctr"/>
-                </a:tc>
-                <a:tc>
-                  <a:txBody>
-                    <a:bodyPr/>
-                    <a:lstStyle/>
-                    <a:p>
-                      <a:r>
-                        <a:rPr lang="en-US" dirty="0">
-                          <a:solidFill>
-                            <a:schemeClr val="accent6"/>
-                          </a:solidFill>
-                        </a:rPr>
-                        <a:t>15</a:t>
-                      </a:r>
-                    </a:p>
-                  </a:txBody>
-                  <a:tcPr anchor="ctr"/>
-                </a:tc>
-                <a:extLst>
-                  <a:ext uri="{0D108BD9-81ED-4DB2-BD59-A6C34878D82A}">
-                    <a16:rowId xmlns:a16="http://schemas.microsoft.com/office/drawing/2014/main" val="1888116840"/>
-                  </a:ext>
-                </a:extLst>
-              </a:tr>
-              <a:tr h="606129">
-                <a:tc>
-                  <a:txBody>
-                    <a:bodyPr/>
-                    <a:lstStyle/>
-                    <a:p>
-                      <a:r>
-                        <a:rPr lang="en-US" dirty="0">
-                          <a:solidFill>
-                            <a:schemeClr val="accent6"/>
-                          </a:solidFill>
-                        </a:rPr>
-                        <a:t>Positive feedback</a:t>
-                      </a:r>
-                    </a:p>
-                  </a:txBody>
-                  <a:tcPr anchor="ctr"/>
-                </a:tc>
-                <a:tc>
-                  <a:txBody>
-                    <a:bodyPr/>
-                    <a:lstStyle/>
-                    <a:p>
-                      <a:r>
-                        <a:rPr lang="en-US" dirty="0">
-                          <a:solidFill>
-                            <a:schemeClr val="accent6"/>
-                          </a:solidFill>
-                        </a:rPr>
-                        <a:t>Percentage (%)</a:t>
-                      </a:r>
-                    </a:p>
-                  </a:txBody>
-                  <a:tcPr anchor="ctr"/>
-                </a:tc>
-                <a:tc>
-                  <a:txBody>
-                    <a:bodyPr/>
-                    <a:lstStyle/>
-                    <a:p>
-                      <a:r>
-                        <a:rPr lang="en-US" dirty="0">
-                          <a:solidFill>
-                            <a:schemeClr val="accent6"/>
-                          </a:solidFill>
-                        </a:rPr>
-                        <a:t>90</a:t>
-                      </a:r>
-                    </a:p>
-                  </a:txBody>
-                  <a:tcPr anchor="ctr"/>
-                </a:tc>
-                <a:tc>
-                  <a:txBody>
-                    <a:bodyPr/>
-                    <a:lstStyle/>
-                    <a:p>
-                      <a:r>
-                        <a:rPr lang="en-US" dirty="0">
-                          <a:solidFill>
-                            <a:schemeClr val="accent6"/>
-                          </a:solidFill>
-                        </a:rPr>
-                        <a:t>95</a:t>
-                      </a:r>
-                    </a:p>
-                  </a:txBody>
-                  <a:tcPr anchor="ctr"/>
-                </a:tc>
-                <a:extLst>
-                  <a:ext uri="{0D108BD9-81ED-4DB2-BD59-A6C34878D82A}">
-                    <a16:rowId xmlns:a16="http://schemas.microsoft.com/office/drawing/2014/main" val="4023592559"/>
-                  </a:ext>
-                </a:extLst>
-              </a:tr>
-              <a:tr h="811265">
-                <a:tc>
-                  <a:txBody>
-                    <a:bodyPr/>
-                    <a:lstStyle/>
-                    <a:p>
-                      <a:r>
-                        <a:rPr lang="en-US" dirty="0">
-                          <a:solidFill>
-                            <a:schemeClr val="accent6"/>
-                          </a:solidFill>
-                        </a:rPr>
-                        <a:t>Rate of information retention</a:t>
-                      </a:r>
-                    </a:p>
-                  </a:txBody>
-                  <a:tcPr anchor="ctr"/>
-                </a:tc>
-                <a:tc>
-                  <a:txBody>
-                    <a:bodyPr/>
-                    <a:lstStyle/>
-                    <a:p>
-                      <a:r>
-                        <a:rPr lang="en-US" dirty="0">
-                          <a:solidFill>
-                            <a:schemeClr val="accent6"/>
-                          </a:solidFill>
-                        </a:rPr>
-                        <a:t>Percentage (%)</a:t>
-                      </a:r>
-                    </a:p>
-                  </a:txBody>
-                  <a:tcPr anchor="ctr"/>
-                </a:tc>
-                <a:tc>
-                  <a:txBody>
-                    <a:bodyPr/>
-                    <a:lstStyle/>
-                    <a:p>
-                      <a:r>
-                        <a:rPr lang="en-US" dirty="0">
-                          <a:solidFill>
-                            <a:schemeClr val="accent6"/>
-                          </a:solidFill>
-                        </a:rPr>
-                        <a:t>80</a:t>
-                      </a:r>
-                    </a:p>
-                  </a:txBody>
-                  <a:tcPr anchor="ctr"/>
-                </a:tc>
-                <a:tc>
-                  <a:txBody>
-                    <a:bodyPr/>
-                    <a:lstStyle/>
-                    <a:p>
-                      <a:r>
-                        <a:rPr lang="en-US" dirty="0">
-                          <a:solidFill>
-                            <a:schemeClr val="accent6"/>
-                          </a:solidFill>
-                        </a:rPr>
-                        <a:t>85</a:t>
-                      </a:r>
-                    </a:p>
-                  </a:txBody>
-                  <a:tcPr anchor="ctr"/>
-                </a:tc>
-                <a:extLst>
-                  <a:ext uri="{0D108BD9-81ED-4DB2-BD59-A6C34878D82A}">
-                    <a16:rowId xmlns:a16="http://schemas.microsoft.com/office/drawing/2014/main" val="2426564953"/>
-                  </a:ext>
-                </a:extLst>
-              </a:tr>
-            </a:tbl>
-          </a:graphicData>
-        </a:graphic>
-      </p:graphicFrame>
-      <p:sp>
-        <p:nvSpPr>
-          <p:cNvPr id="2" name="Slide Number Placeholder 1">
-            <a:extLst>
-              <a:ext uri="{FF2B5EF4-FFF2-40B4-BE49-F238E27FC236}">
-                <a16:creationId xmlns:a16="http://schemas.microsoft.com/office/drawing/2014/main" id="{A913EEC9-16E3-6C86-97D0-A7EC7EA09CDA}"/>
-              </a:ext>
-            </a:extLst>
-          </p:cNvPr>
-          <p:cNvSpPr>
-            <a:spLocks noGrp="1"/>
-          </p:cNvSpPr>
-          <p:nvPr>
-            <p:ph type="sldNum" sz="quarter" idx="10"/>
-          </p:nvPr>
-        </p:nvSpPr>
-        <p:spPr>
-          <a:xfrm>
-            <a:off x="10358437" y="457199"/>
-            <a:ext cx="1067589" cy="471489"/>
-          </a:xfrm>
-        </p:spPr>
-        <p:txBody>
-          <a:bodyPr/>
-          <a:lstStyle/>
-          <a:p>
-            <a:fld id="{48F63A3B-78C7-47BE-AE5E-E10140E04643}" type="slidenum">
-              <a:rPr lang="en-US" smtClean="0"/>
-              <a:pPr/>
-              <a:t>10</a:t>
-            </a:fld>
-            <a:endParaRPr lang="en-US" dirty="0"/>
-          </a:p>
-        </p:txBody>
-      </p:sp>
-    </p:spTree>
-    <p:extLst>
-      <p:ext uri="{BB962C8B-B14F-4D97-AF65-F5344CB8AC3E}">
-        <p14:creationId xmlns:p14="http://schemas.microsoft.com/office/powerpoint/2010/main" val="3969996159"/>
-      </p:ext>
-    </p:extLst>
-  </p:cSld>
-  <p:clrMapOvr>
-    <a:masterClrMapping/>
-  </p:clrMapOvr>
-</p:sld>
-</file>
-
-<file path=ppt/slides/slide11.xml><?xml version="1.0" encoding="utf-8"?>
-<p:sld xmlns:a="http://schemas.openxmlformats.org/drawingml/2006/main" xmlns:r="http://schemas.openxmlformats.org/officeDocument/2006/relationships" xmlns:p="http://schemas.openxmlformats.org/presentationml/2006/main">
-  <p:cSld>
-    <p:spTree>
-      <p:nvGrpSpPr>
-        <p:cNvPr id="1" name=""/>
-        <p:cNvGrpSpPr/>
-        <p:nvPr/>
-      </p:nvGrpSpPr>
-      <p:grpSpPr>
-        <a:xfrm>
-          <a:off x="0" y="0"/>
-          <a:ext cx="0" cy="0"/>
-          <a:chOff x="0" y="0"/>
-          <a:chExt cx="0" cy="0"/>
-        </a:xfrm>
-      </p:grpSpPr>
-      <p:sp>
-        <p:nvSpPr>
-          <p:cNvPr id="3" name="Title 2">
-            <a:extLst>
-              <a:ext uri="{FF2B5EF4-FFF2-40B4-BE49-F238E27FC236}">
-                <a16:creationId xmlns:a16="http://schemas.microsoft.com/office/drawing/2014/main" id="{38D62608-F5E4-7EC0-5EF0-4F988DDDEC5B}"/>
-              </a:ext>
-            </a:extLst>
-          </p:cNvPr>
-          <p:cNvSpPr>
-            <a:spLocks noGrp="1"/>
-          </p:cNvSpPr>
-          <p:nvPr>
-            <p:ph type="title"/>
-          </p:nvPr>
-        </p:nvSpPr>
-        <p:spPr>
-          <a:xfrm>
-            <a:off x="1550564" y="1057274"/>
-            <a:ext cx="9875463" cy="999746"/>
-          </a:xfrm>
-        </p:spPr>
-        <p:txBody>
-          <a:bodyPr/>
-          <a:lstStyle/>
-          <a:p>
-            <a:r>
-              <a:rPr lang="en-US" dirty="0"/>
-              <a:t>Final tips &amp; takeaways</a:t>
-            </a:r>
-          </a:p>
-        </p:txBody>
-      </p:sp>
-      <p:sp>
-        <p:nvSpPr>
-          <p:cNvPr id="12" name="Content Placeholder 3">
-            <a:extLst>
-              <a:ext uri="{FF2B5EF4-FFF2-40B4-BE49-F238E27FC236}">
-                <a16:creationId xmlns:a16="http://schemas.microsoft.com/office/drawing/2014/main" id="{288BD9B8-D6A6-D55A-830D-4D3CC2DC3933}"/>
-              </a:ext>
-            </a:extLst>
-          </p:cNvPr>
-          <p:cNvSpPr>
-            <a:spLocks noGrp="1"/>
-          </p:cNvSpPr>
-          <p:nvPr>
-            <p:ph sz="half" idx="2"/>
-          </p:nvPr>
-        </p:nvSpPr>
-        <p:spPr>
-          <a:xfrm>
-            <a:off x="1550564" y="2303028"/>
-            <a:ext cx="5829147" cy="3961593"/>
-          </a:xfrm>
-        </p:spPr>
-        <p:txBody>
-          <a:bodyPr>
-            <a:normAutofit/>
-          </a:bodyPr>
-          <a:lstStyle/>
-          <a:p>
-            <a:r>
-              <a:rPr lang="en-US" dirty="0"/>
-              <a:t>Consistent rehearsal</a:t>
-            </a:r>
-          </a:p>
-          <a:p>
-            <a:pPr lvl="1"/>
-            <a:r>
-              <a:rPr lang="en-US" dirty="0"/>
-              <a:t>Strengthen your familiarity</a:t>
-            </a:r>
-          </a:p>
-          <a:p>
-            <a:r>
-              <a:rPr lang="en-US" dirty="0"/>
-              <a:t>Refine delivery style</a:t>
-            </a:r>
-          </a:p>
-          <a:p>
-            <a:pPr lvl="1"/>
-            <a:r>
-              <a:rPr lang="en-US" dirty="0"/>
-              <a:t>Pacing, tone, and emphasis</a:t>
-            </a:r>
-          </a:p>
-          <a:p>
-            <a:r>
-              <a:rPr lang="en-US" dirty="0"/>
-              <a:t>Timing and transitions</a:t>
-            </a:r>
-          </a:p>
-          <a:p>
-            <a:pPr lvl="1"/>
-            <a:r>
-              <a:rPr lang="en-US" dirty="0"/>
-              <a:t>Aim for seamless, professional delivery</a:t>
-            </a:r>
-          </a:p>
-          <a:p>
-            <a:r>
-              <a:rPr lang="en-US" dirty="0"/>
-              <a:t>Practice audience</a:t>
-            </a:r>
-          </a:p>
-          <a:p>
-            <a:pPr lvl="1"/>
-            <a:r>
-              <a:rPr lang="en-US" dirty="0"/>
-              <a:t>Enlist colleagues to listen &amp; provide feedback</a:t>
-            </a:r>
-          </a:p>
-        </p:txBody>
-      </p:sp>
-      <p:sp>
-        <p:nvSpPr>
-          <p:cNvPr id="13" name="Content Placeholder 7">
-            <a:extLst>
-              <a:ext uri="{FF2B5EF4-FFF2-40B4-BE49-F238E27FC236}">
-                <a16:creationId xmlns:a16="http://schemas.microsoft.com/office/drawing/2014/main" id="{0853098E-C088-D323-4BF2-987893F262F6}"/>
-              </a:ext>
-            </a:extLst>
-          </p:cNvPr>
-          <p:cNvSpPr>
-            <a:spLocks noGrp="1"/>
-          </p:cNvSpPr>
-          <p:nvPr>
-            <p:ph sz="half" idx="15"/>
-          </p:nvPr>
-        </p:nvSpPr>
-        <p:spPr>
-          <a:xfrm>
-            <a:off x="7940842" y="2303028"/>
-            <a:ext cx="3485184" cy="3961593"/>
-          </a:xfrm>
-        </p:spPr>
-        <p:txBody>
-          <a:bodyPr/>
-          <a:lstStyle/>
-          <a:p>
-            <a:r>
-              <a:rPr lang="en-US" dirty="0"/>
-              <a:t>Seek feedback</a:t>
-            </a:r>
-          </a:p>
-          <a:p>
-            <a:r>
-              <a:rPr lang="en-US" dirty="0"/>
-              <a:t>Reflect on performance</a:t>
-            </a:r>
-          </a:p>
-          <a:p>
-            <a:r>
-              <a:rPr lang="en-US" dirty="0"/>
-              <a:t>Explore new techniques</a:t>
-            </a:r>
-          </a:p>
-          <a:p>
-            <a:r>
-              <a:rPr lang="en-US" dirty="0"/>
-              <a:t>Set personal goals</a:t>
-            </a:r>
-          </a:p>
-          <a:p>
-            <a:r>
-              <a:rPr lang="en-US" dirty="0"/>
-              <a:t>Iterate and adapt</a:t>
-            </a:r>
-          </a:p>
-        </p:txBody>
-      </p:sp>
-      <p:sp>
-        <p:nvSpPr>
-          <p:cNvPr id="2" name="Slide Number Placeholder 1">
-            <a:extLst>
-              <a:ext uri="{FF2B5EF4-FFF2-40B4-BE49-F238E27FC236}">
-                <a16:creationId xmlns:a16="http://schemas.microsoft.com/office/drawing/2014/main" id="{1DCFAD14-1AAA-8CDA-A49B-523FD6C66F35}"/>
-              </a:ext>
-            </a:extLst>
-          </p:cNvPr>
-          <p:cNvSpPr>
-            <a:spLocks noGrp="1"/>
-          </p:cNvSpPr>
-          <p:nvPr>
-            <p:ph type="sldNum" sz="quarter" idx="10"/>
-          </p:nvPr>
-        </p:nvSpPr>
-        <p:spPr>
-          <a:xfrm>
-            <a:off x="10438475" y="457199"/>
-            <a:ext cx="987552" cy="471489"/>
-          </a:xfrm>
-        </p:spPr>
-        <p:txBody>
-          <a:bodyPr/>
-          <a:lstStyle/>
-          <a:p>
-            <a:fld id="{48F63A3B-78C7-47BE-AE5E-E10140E04643}" type="slidenum">
-              <a:rPr lang="en-US" smtClean="0"/>
-              <a:pPr/>
-              <a:t>11</a:t>
-            </a:fld>
-            <a:endParaRPr lang="en-US" dirty="0"/>
-          </a:p>
-        </p:txBody>
-      </p:sp>
-    </p:spTree>
-    <p:extLst>
-      <p:ext uri="{BB962C8B-B14F-4D97-AF65-F5344CB8AC3E}">
-        <p14:creationId xmlns:p14="http://schemas.microsoft.com/office/powerpoint/2010/main" val="2498021601"/>
-      </p:ext>
-    </p:extLst>
-  </p:cSld>
-  <p:clrMapOvr>
-    <a:masterClrMapping/>
-  </p:clrMapOvr>
-</p:sld>
-</file>
-
-<file path=ppt/slides/slide12.xml><?xml version="1.0" encoding="utf-8"?>
-<p:sld xmlns:a="http://schemas.openxmlformats.org/drawingml/2006/main" xmlns:r="http://schemas.openxmlformats.org/officeDocument/2006/relationships" xmlns:p="http://schemas.openxmlformats.org/presentationml/2006/main">
-  <p:cSld>
-    <p:spTree>
-      <p:nvGrpSpPr>
-        <p:cNvPr id="1" name=""/>
-        <p:cNvGrpSpPr/>
-        <p:nvPr/>
-      </p:nvGrpSpPr>
-      <p:grpSpPr>
-        <a:xfrm>
-          <a:off x="0" y="0"/>
-          <a:ext cx="0" cy="0"/>
-          <a:chOff x="0" y="0"/>
-          <a:chExt cx="0" cy="0"/>
-        </a:xfrm>
-      </p:grpSpPr>
-      <p:sp>
-        <p:nvSpPr>
-          <p:cNvPr id="2" name="Title 1">
-            <a:extLst>
-              <a:ext uri="{FF2B5EF4-FFF2-40B4-BE49-F238E27FC236}">
-                <a16:creationId xmlns:a16="http://schemas.microsoft.com/office/drawing/2014/main" id="{4730A324-0737-F0DA-1F7D-10CBE06D7C3F}"/>
-              </a:ext>
-            </a:extLst>
-          </p:cNvPr>
-          <p:cNvSpPr>
-            <a:spLocks noGrp="1"/>
-          </p:cNvSpPr>
-          <p:nvPr>
-            <p:ph type="title"/>
-          </p:nvPr>
-        </p:nvSpPr>
-        <p:spPr>
-          <a:xfrm>
-            <a:off x="914400" y="1057274"/>
-            <a:ext cx="10511627" cy="1012785"/>
-          </a:xfrm>
-        </p:spPr>
-        <p:txBody>
-          <a:bodyPr/>
-          <a:lstStyle/>
-          <a:p>
-            <a:r>
-              <a:rPr lang="en-US" dirty="0"/>
-              <a:t>Speaking engagement metrics</a:t>
-            </a:r>
-          </a:p>
-        </p:txBody>
-      </p:sp>
-      <p:graphicFrame>
-        <p:nvGraphicFramePr>
-          <p:cNvPr id="5" name="Content Placeholder 4">
-            <a:extLst>
-              <a:ext uri="{FF2B5EF4-FFF2-40B4-BE49-F238E27FC236}">
-                <a16:creationId xmlns:a16="http://schemas.microsoft.com/office/drawing/2014/main" id="{AC0C7FF8-9CAF-6C67-C1E5-AF40401D0B3D}"/>
-              </a:ext>
-            </a:extLst>
-          </p:cNvPr>
-          <p:cNvGraphicFramePr>
-            <a:graphicFrameLocks noGrp="1"/>
-          </p:cNvGraphicFramePr>
-          <p:nvPr>
-            <p:ph sz="quarter" idx="4"/>
-            <p:extLst>
-              <p:ext uri="{D42A27DB-BD31-4B8C-83A1-F6EECF244321}">
-                <p14:modId xmlns:p14="http://schemas.microsoft.com/office/powerpoint/2010/main" val="3999503228"/>
-              </p:ext>
-            </p:extLst>
-          </p:nvPr>
-        </p:nvGraphicFramePr>
-        <p:xfrm>
-          <a:off x="914400" y="2316163"/>
-          <a:ext cx="10510836" cy="3948462"/>
-        </p:xfrm>
-        <a:graphic>
-          <a:graphicData uri="http://schemas.openxmlformats.org/drawingml/2006/table">
-            <a:tbl>
-              <a:tblPr firstRow="1" bandRow="1">
-                <a:tableStyleId>{C083E6E3-FA7D-4D7B-A595-EF9225AFEA82}</a:tableStyleId>
-              </a:tblPr>
-              <a:tblGrid>
-                <a:gridCol w="4080076">
-                  <a:extLst>
-                    <a:ext uri="{9D8B030D-6E8A-4147-A177-3AD203B41FA5}">
-                      <a16:colId xmlns:a16="http://schemas.microsoft.com/office/drawing/2014/main" val="1764027237"/>
-                    </a:ext>
-                  </a:extLst>
-                </a:gridCol>
-                <a:gridCol w="4080076">
-                  <a:extLst>
-                    <a:ext uri="{9D8B030D-6E8A-4147-A177-3AD203B41FA5}">
-                      <a16:colId xmlns:a16="http://schemas.microsoft.com/office/drawing/2014/main" val="778914542"/>
-                    </a:ext>
-                  </a:extLst>
-                </a:gridCol>
-                <a:gridCol w="1175342">
-                  <a:extLst>
-                    <a:ext uri="{9D8B030D-6E8A-4147-A177-3AD203B41FA5}">
-                      <a16:colId xmlns:a16="http://schemas.microsoft.com/office/drawing/2014/main" val="4233386372"/>
-                    </a:ext>
-                  </a:extLst>
-                </a:gridCol>
-                <a:gridCol w="1175342">
-                  <a:extLst>
-                    <a:ext uri="{9D8B030D-6E8A-4147-A177-3AD203B41FA5}">
-                      <a16:colId xmlns:a16="http://schemas.microsoft.com/office/drawing/2014/main" val="1626524931"/>
-                    </a:ext>
-                  </a:extLst>
-                </a:gridCol>
-              </a:tblGrid>
-              <a:tr h="658077">
-                <a:tc>
-                  <a:txBody>
-                    <a:bodyPr/>
-                    <a:lstStyle/>
-                    <a:p>
-                      <a:r>
-                        <a:rPr lang="en-US" dirty="0"/>
-                        <a:t>Impact factor</a:t>
-                      </a:r>
-                    </a:p>
-                  </a:txBody>
-                  <a:tcPr anchor="ctr"/>
-                </a:tc>
-                <a:tc>
-                  <a:txBody>
-                    <a:bodyPr/>
-                    <a:lstStyle/>
-                    <a:p>
-                      <a:r>
-                        <a:rPr lang="en-US" dirty="0"/>
-                        <a:t>Measurement</a:t>
-                      </a:r>
-                    </a:p>
-                  </a:txBody>
-                  <a:tcPr anchor="ctr"/>
-                </a:tc>
-                <a:tc>
-                  <a:txBody>
-                    <a:bodyPr/>
-                    <a:lstStyle/>
-                    <a:p>
-                      <a:r>
-                        <a:rPr lang="en-US" dirty="0"/>
-                        <a:t>Target</a:t>
-                      </a:r>
-                    </a:p>
-                  </a:txBody>
-                  <a:tcPr anchor="ctr"/>
-                </a:tc>
-                <a:tc>
-                  <a:txBody>
-                    <a:bodyPr/>
-                    <a:lstStyle/>
-                    <a:p>
-                      <a:r>
-                        <a:rPr lang="en-US" dirty="0"/>
-                        <a:t>Achieved</a:t>
-                      </a:r>
-                    </a:p>
-                  </a:txBody>
-                  <a:tcPr anchor="ctr"/>
-                </a:tc>
-                <a:extLst>
-                  <a:ext uri="{0D108BD9-81ED-4DB2-BD59-A6C34878D82A}">
-                    <a16:rowId xmlns:a16="http://schemas.microsoft.com/office/drawing/2014/main" val="2865033212"/>
-                  </a:ext>
-                </a:extLst>
-              </a:tr>
-              <a:tr h="658077">
-                <a:tc>
-                  <a:txBody>
-                    <a:bodyPr/>
-                    <a:lstStyle/>
-                    <a:p>
-                      <a:r>
-                        <a:rPr lang="en-US" dirty="0"/>
-                        <a:t>Audience interaction</a:t>
-                      </a:r>
-                    </a:p>
-                  </a:txBody>
-                  <a:tcPr anchor="ctr"/>
-                </a:tc>
-                <a:tc>
-                  <a:txBody>
-                    <a:bodyPr/>
-                    <a:lstStyle/>
-                    <a:p>
-                      <a:r>
-                        <a:rPr lang="en-US" dirty="0"/>
-                        <a:t>Percentage (%)</a:t>
-                      </a:r>
-                    </a:p>
-                  </a:txBody>
-                  <a:tcPr anchor="ctr"/>
-                </a:tc>
-                <a:tc>
-                  <a:txBody>
-                    <a:bodyPr/>
-                    <a:lstStyle/>
-                    <a:p>
-                      <a:r>
-                        <a:rPr lang="en-US" dirty="0"/>
-                        <a:t>85</a:t>
-                      </a:r>
-                    </a:p>
-                  </a:txBody>
-                  <a:tcPr anchor="ctr"/>
-                </a:tc>
-                <a:tc>
-                  <a:txBody>
-                    <a:bodyPr/>
-                    <a:lstStyle/>
-                    <a:p>
-                      <a:r>
-                        <a:rPr lang="en-US" dirty="0"/>
-                        <a:t>88</a:t>
-                      </a:r>
-                    </a:p>
-                  </a:txBody>
-                  <a:tcPr anchor="ctr"/>
-                </a:tc>
-                <a:extLst>
-                  <a:ext uri="{0D108BD9-81ED-4DB2-BD59-A6C34878D82A}">
-                    <a16:rowId xmlns:a16="http://schemas.microsoft.com/office/drawing/2014/main" val="773796761"/>
-                  </a:ext>
-                </a:extLst>
-              </a:tr>
-              <a:tr h="658077">
-                <a:tc>
-                  <a:txBody>
-                    <a:bodyPr/>
-                    <a:lstStyle/>
-                    <a:p>
-                      <a:r>
-                        <a:rPr lang="en-US" dirty="0"/>
-                        <a:t>Knowledge retention</a:t>
-                      </a:r>
-                    </a:p>
-                  </a:txBody>
-                  <a:tcPr anchor="ctr"/>
-                </a:tc>
-                <a:tc>
-                  <a:txBody>
-                    <a:bodyPr/>
-                    <a:lstStyle/>
-                    <a:p>
-                      <a:r>
-                        <a:rPr lang="en-US" dirty="0"/>
-                        <a:t>Percentage (%)</a:t>
-                      </a:r>
-                    </a:p>
-                  </a:txBody>
-                  <a:tcPr anchor="ctr"/>
-                </a:tc>
-                <a:tc>
-                  <a:txBody>
-                    <a:bodyPr/>
-                    <a:lstStyle/>
-                    <a:p>
-                      <a:r>
-                        <a:rPr lang="en-US" dirty="0"/>
-                        <a:t>75</a:t>
-                      </a:r>
-                    </a:p>
-                  </a:txBody>
-                  <a:tcPr anchor="ctr"/>
-                </a:tc>
-                <a:tc>
-                  <a:txBody>
-                    <a:bodyPr/>
-                    <a:lstStyle/>
-                    <a:p>
-                      <a:r>
-                        <a:rPr lang="en-US" dirty="0"/>
-                        <a:t>80</a:t>
-                      </a:r>
-                    </a:p>
-                  </a:txBody>
-                  <a:tcPr anchor="ctr"/>
-                </a:tc>
-                <a:extLst>
-                  <a:ext uri="{0D108BD9-81ED-4DB2-BD59-A6C34878D82A}">
-                    <a16:rowId xmlns:a16="http://schemas.microsoft.com/office/drawing/2014/main" val="1789202252"/>
-                  </a:ext>
-                </a:extLst>
-              </a:tr>
-              <a:tr h="658077">
-                <a:tc>
-                  <a:txBody>
-                    <a:bodyPr/>
-                    <a:lstStyle/>
-                    <a:p>
-                      <a:r>
-                        <a:rPr lang="en-US" dirty="0"/>
-                        <a:t>Post-presentation surveys</a:t>
-                      </a:r>
-                    </a:p>
-                  </a:txBody>
-                  <a:tcPr anchor="ctr"/>
-                </a:tc>
-                <a:tc>
-                  <a:txBody>
-                    <a:bodyPr/>
-                    <a:lstStyle/>
-                    <a:p>
-                      <a:r>
-                        <a:rPr lang="en-US" dirty="0"/>
-                        <a:t>Average rating</a:t>
-                      </a:r>
-                    </a:p>
-                  </a:txBody>
-                  <a:tcPr anchor="ctr"/>
-                </a:tc>
-                <a:tc>
-                  <a:txBody>
-                    <a:bodyPr/>
-                    <a:lstStyle/>
-                    <a:p>
-                      <a:r>
-                        <a:rPr lang="en-US" dirty="0"/>
-                        <a:t>4.2</a:t>
-                      </a:r>
-                    </a:p>
-                  </a:txBody>
-                  <a:tcPr anchor="ctr"/>
-                </a:tc>
-                <a:tc>
-                  <a:txBody>
-                    <a:bodyPr/>
-                    <a:lstStyle/>
-                    <a:p>
-                      <a:r>
-                        <a:rPr lang="en-US" dirty="0"/>
-                        <a:t>4.5</a:t>
-                      </a:r>
-                    </a:p>
-                  </a:txBody>
-                  <a:tcPr anchor="ctr"/>
-                </a:tc>
-                <a:extLst>
-                  <a:ext uri="{0D108BD9-81ED-4DB2-BD59-A6C34878D82A}">
-                    <a16:rowId xmlns:a16="http://schemas.microsoft.com/office/drawing/2014/main" val="2325356481"/>
-                  </a:ext>
-                </a:extLst>
-              </a:tr>
-              <a:tr h="658077">
-                <a:tc>
-                  <a:txBody>
-                    <a:bodyPr/>
-                    <a:lstStyle/>
-                    <a:p>
-                      <a:r>
-                        <a:rPr lang="en-US" dirty="0"/>
-                        <a:t>Referral rate</a:t>
-                      </a:r>
-                    </a:p>
-                  </a:txBody>
-                  <a:tcPr anchor="ctr"/>
-                </a:tc>
-                <a:tc>
-                  <a:txBody>
-                    <a:bodyPr/>
-                    <a:lstStyle/>
-                    <a:p>
-                      <a:r>
-                        <a:rPr lang="en-US" dirty="0"/>
-                        <a:t>Percentage (%)</a:t>
-                      </a:r>
-                    </a:p>
-                  </a:txBody>
-                  <a:tcPr anchor="ctr"/>
-                </a:tc>
-                <a:tc>
-                  <a:txBody>
-                    <a:bodyPr/>
-                    <a:lstStyle/>
-                    <a:p>
-                      <a:r>
-                        <a:rPr lang="en-US" dirty="0"/>
-                        <a:t>10</a:t>
-                      </a:r>
-                    </a:p>
-                  </a:txBody>
-                  <a:tcPr anchor="ctr"/>
-                </a:tc>
-                <a:tc>
-                  <a:txBody>
-                    <a:bodyPr/>
-                    <a:lstStyle/>
-                    <a:p>
-                      <a:r>
-                        <a:rPr lang="en-US" dirty="0"/>
-                        <a:t>12</a:t>
-                      </a:r>
-                    </a:p>
-                  </a:txBody>
-                  <a:tcPr anchor="ctr"/>
-                </a:tc>
-                <a:extLst>
-                  <a:ext uri="{0D108BD9-81ED-4DB2-BD59-A6C34878D82A}">
-                    <a16:rowId xmlns:a16="http://schemas.microsoft.com/office/drawing/2014/main" val="3322085491"/>
-                  </a:ext>
-                </a:extLst>
-              </a:tr>
-              <a:tr h="658077">
-                <a:tc>
-                  <a:txBody>
-                    <a:bodyPr/>
-                    <a:lstStyle/>
-                    <a:p>
-                      <a:r>
-                        <a:rPr lang="en-US" dirty="0"/>
-                        <a:t>Collaboration opportunities</a:t>
-                      </a:r>
-                    </a:p>
-                  </a:txBody>
-                  <a:tcPr anchor="ctr"/>
-                </a:tc>
-                <a:tc>
-                  <a:txBody>
-                    <a:bodyPr/>
-                    <a:lstStyle/>
-                    <a:p>
-                      <a:r>
-                        <a:rPr lang="en-US" dirty="0"/>
-                        <a:t># of opportunities</a:t>
-                      </a:r>
-                    </a:p>
-                  </a:txBody>
-                  <a:tcPr anchor="ctr"/>
-                </a:tc>
-                <a:tc>
-                  <a:txBody>
-                    <a:bodyPr/>
-                    <a:lstStyle/>
-                    <a:p>
-                      <a:r>
-                        <a:rPr lang="en-US" dirty="0"/>
-                        <a:t>8</a:t>
-                      </a:r>
-                    </a:p>
-                  </a:txBody>
-                  <a:tcPr anchor="ctr"/>
-                </a:tc>
-                <a:tc>
-                  <a:txBody>
-                    <a:bodyPr/>
-                    <a:lstStyle/>
-                    <a:p>
-                      <a:r>
-                        <a:rPr lang="en-US" dirty="0"/>
-                        <a:t>10</a:t>
-                      </a:r>
-                    </a:p>
-                  </a:txBody>
-                  <a:tcPr anchor="ctr"/>
-                </a:tc>
-                <a:extLst>
-                  <a:ext uri="{0D108BD9-81ED-4DB2-BD59-A6C34878D82A}">
-                    <a16:rowId xmlns:a16="http://schemas.microsoft.com/office/drawing/2014/main" val="2682318458"/>
-                  </a:ext>
-                </a:extLst>
-              </a:tr>
-            </a:tbl>
-          </a:graphicData>
-        </a:graphic>
-      </p:graphicFrame>
-      <p:sp>
-        <p:nvSpPr>
-          <p:cNvPr id="3" name="Slide Number Placeholder 2">
-            <a:extLst>
-              <a:ext uri="{FF2B5EF4-FFF2-40B4-BE49-F238E27FC236}">
-                <a16:creationId xmlns:a16="http://schemas.microsoft.com/office/drawing/2014/main" id="{AC21286A-7B29-3B58-1636-0F45723890AB}"/>
-              </a:ext>
-            </a:extLst>
-          </p:cNvPr>
-          <p:cNvSpPr>
-            <a:spLocks noGrp="1"/>
-          </p:cNvSpPr>
-          <p:nvPr>
-            <p:ph type="sldNum" sz="quarter" idx="10"/>
-          </p:nvPr>
-        </p:nvSpPr>
-        <p:spPr>
-          <a:xfrm>
-            <a:off x="10358437" y="457199"/>
-            <a:ext cx="1067589" cy="471489"/>
-          </a:xfrm>
-        </p:spPr>
-        <p:txBody>
-          <a:bodyPr/>
-          <a:lstStyle/>
-          <a:p>
-            <a:fld id="{48F63A3B-78C7-47BE-AE5E-E10140E04643}" type="slidenum">
-              <a:rPr lang="en-US" smtClean="0"/>
-              <a:pPr/>
-              <a:t>12</a:t>
-            </a:fld>
-            <a:endParaRPr lang="en-US" dirty="0"/>
-          </a:p>
-        </p:txBody>
-      </p:sp>
-    </p:spTree>
-    <p:extLst>
-      <p:ext uri="{BB962C8B-B14F-4D97-AF65-F5344CB8AC3E}">
-        <p14:creationId xmlns:p14="http://schemas.microsoft.com/office/powerpoint/2010/main" val="1686213229"/>
-      </p:ext>
-    </p:extLst>
-  </p:cSld>
-  <p:clrMapOvr>
-    <a:masterClrMapping/>
-  </p:clrMapOvr>
-</p:sld>
-</file>
-
-<file path=ppt/slides/slide13.xml><?xml version="1.0" encoding="utf-8"?>
-<p:sld xmlns:a="http://schemas.openxmlformats.org/drawingml/2006/main" xmlns:r="http://schemas.openxmlformats.org/officeDocument/2006/relationships" xmlns:p="http://schemas.openxmlformats.org/presentationml/2006/main">
-  <p:cSld>
-    <p:spTree>
-      <p:nvGrpSpPr>
-        <p:cNvPr id="1" name=""/>
-        <p:cNvGrpSpPr/>
-        <p:nvPr/>
-      </p:nvGrpSpPr>
-      <p:grpSpPr>
-        <a:xfrm>
-          <a:off x="0" y="0"/>
-          <a:ext cx="0" cy="0"/>
-          <a:chOff x="0" y="0"/>
-          <a:chExt cx="0" cy="0"/>
-        </a:xfrm>
-      </p:grpSpPr>
-      <p:sp>
-        <p:nvSpPr>
-          <p:cNvPr id="2" name="Title 1">
-            <a:extLst>
-              <a:ext uri="{FF2B5EF4-FFF2-40B4-BE49-F238E27FC236}">
-                <a16:creationId xmlns:a16="http://schemas.microsoft.com/office/drawing/2014/main" id="{509D22C5-0C9E-B582-A8FE-B45E70A01E7F}"/>
-              </a:ext>
-            </a:extLst>
-          </p:cNvPr>
-          <p:cNvSpPr>
-            <a:spLocks noGrp="1"/>
-          </p:cNvSpPr>
-          <p:nvPr>
-            <p:ph type="ctrTitle"/>
-          </p:nvPr>
-        </p:nvSpPr>
-        <p:spPr>
-          <a:xfrm>
-            <a:off x="914401" y="849782"/>
-            <a:ext cx="5715000" cy="2727709"/>
-          </a:xfrm>
-        </p:spPr>
-        <p:txBody>
-          <a:bodyPr/>
-          <a:lstStyle/>
-          <a:p>
-            <a:r>
-              <a:rPr lang="en-US" dirty="0"/>
-              <a:t>Thank </a:t>
-            </a:r>
-            <a:br>
-              <a:rPr lang="en-US" dirty="0"/>
-            </a:br>
-            <a:r>
-              <a:rPr lang="en-US" dirty="0"/>
-              <a:t>you</a:t>
-            </a:r>
-          </a:p>
-        </p:txBody>
-      </p:sp>
-      <p:sp>
-        <p:nvSpPr>
-          <p:cNvPr id="3" name="Subtitle 2">
-            <a:extLst>
-              <a:ext uri="{FF2B5EF4-FFF2-40B4-BE49-F238E27FC236}">
-                <a16:creationId xmlns:a16="http://schemas.microsoft.com/office/drawing/2014/main" id="{D8B5CEF2-E667-BBB5-2EA6-C06F93B6DE12}"/>
-              </a:ext>
-            </a:extLst>
-          </p:cNvPr>
-          <p:cNvSpPr>
-            <a:spLocks noGrp="1"/>
-          </p:cNvSpPr>
-          <p:nvPr>
-            <p:ph type="subTitle" idx="1"/>
-          </p:nvPr>
-        </p:nvSpPr>
-        <p:spPr>
-          <a:xfrm>
-            <a:off x="914401" y="3813606"/>
-            <a:ext cx="5715000" cy="2234642"/>
-          </a:xfrm>
-        </p:spPr>
-        <p:txBody>
-          <a:bodyPr/>
-          <a:lstStyle/>
-          <a:p>
-            <a:r>
-              <a:rPr lang="en-US" dirty="0"/>
-              <a:t>Brita Tamm</a:t>
-            </a:r>
-          </a:p>
-          <a:p>
-            <a:r>
-              <a:rPr lang="en-US" dirty="0"/>
-              <a:t>502-555-0152</a:t>
-            </a:r>
-          </a:p>
-          <a:p>
-            <a:r>
-              <a:rPr lang="en-US" dirty="0"/>
-              <a:t>brita@firstupconsultants.com </a:t>
-            </a:r>
-          </a:p>
-          <a:p>
-            <a:r>
-              <a:rPr lang="en-US" dirty="0"/>
-              <a:t>www.firstupconsultants.com</a:t>
-            </a:r>
-          </a:p>
-        </p:txBody>
-      </p:sp>
-    </p:spTree>
-    <p:extLst>
-      <p:ext uri="{BB962C8B-B14F-4D97-AF65-F5344CB8AC3E}">
-        <p14:creationId xmlns:p14="http://schemas.microsoft.com/office/powerpoint/2010/main" val="1973173046"/>
-      </p:ext>
-    </p:extLst>
-  </p:cSld>
-  <p:clrMapOvr>
-    <a:masterClrMapping/>
-  </p:clrMapOvr>
-</p:sld>
-</file>
-
 <file path=ppt/slides/slide2.xml><?xml version="1.0" encoding="utf-8"?>
 <p:sld xmlns:a="http://schemas.openxmlformats.org/drawingml/2006/main" xmlns:r="http://schemas.openxmlformats.org/officeDocument/2006/relationships" xmlns:p="http://schemas.openxmlformats.org/presentationml/2006/main">
   <p:cSld>
@@ -19406,7 +16875,7 @@
           <p:cNvPr id="2" name="Title 1">
             <a:extLst>
               <a:ext uri="{FF2B5EF4-FFF2-40B4-BE49-F238E27FC236}">
-                <a16:creationId xmlns:a16="http://schemas.microsoft.com/office/drawing/2014/main" id="{13021072-4A77-DB4D-DF41-58EADB7DA94E}"/>
+                <a16:creationId xmlns:a16="http://schemas.microsoft.com/office/drawing/2014/main" id="{41E6FC12-7748-1901-B7C8-1D66D580AF00}"/>
               </a:ext>
             </a:extLst>
           </p:cNvPr>
@@ -19424,12 +16893,14 @@
           </a:xfrm>
         </p:spPr>
         <p:txBody>
-          <a:bodyPr/>
+          <a:bodyPr anchor="b">
+            <a:normAutofit/>
+          </a:bodyPr>
           <a:lstStyle/>
           <a:p>
             <a:r>
-              <a:rPr lang="en-US" dirty="0"/>
-              <a:t>agenda</a:t>
+              <a:rPr lang="en-CA" dirty="0"/>
+              <a:t>Objective</a:t>
             </a:r>
           </a:p>
         </p:txBody>
@@ -19439,7 +16910,7 @@
           <p:cNvPr id="3" name="Content Placeholder 2">
             <a:extLst>
               <a:ext uri="{FF2B5EF4-FFF2-40B4-BE49-F238E27FC236}">
-                <a16:creationId xmlns:a16="http://schemas.microsoft.com/office/drawing/2014/main" id="{D4D22962-3C7F-E480-5C35-7F4860A098E1}"/>
+                <a16:creationId xmlns:a16="http://schemas.microsoft.com/office/drawing/2014/main" id="{58A2D042-F8BE-EEEE-9F9C-DFFD7B30FA80}"/>
               </a:ext>
             </a:extLst>
           </p:cNvPr>
@@ -19457,46 +16928,31 @@
           </a:xfrm>
         </p:spPr>
         <p:txBody>
-          <a:bodyPr/>
+          <a:bodyPr>
+            <a:normAutofit/>
+          </a:bodyPr>
           <a:lstStyle/>
           <a:p>
+            <a:pPr marL="0" indent="0">
+              <a:spcAft>
+                <a:spcPts val="600"/>
+              </a:spcAft>
+              <a:buNone/>
+            </a:pPr>
             <a:r>
-              <a:rPr lang="en-US" dirty="0"/>
-              <a:t>Introduction</a:t>
+              <a:rPr lang="en-US"/>
+              <a:t>Produce a simulation of the Makerspace 3D printing services available in the STEM building at the University of Ottawa</a:t>
             </a:r>
-          </a:p>
-          <a:p>
-            <a:r>
-              <a:rPr lang="en-US" dirty="0"/>
-              <a:t>Building confidence</a:t>
-            </a:r>
-          </a:p>
-          <a:p>
-            <a:r>
-              <a:rPr lang="en-US" dirty="0"/>
-              <a:t>Engaging the audience</a:t>
-            </a:r>
-          </a:p>
-          <a:p>
-            <a:r>
-              <a:rPr lang="en-US" dirty="0"/>
-              <a:t>Visual aids</a:t>
-            </a:r>
-          </a:p>
-          <a:p>
-            <a:r>
-              <a:rPr lang="en-US" dirty="0"/>
-              <a:t>Final tips &amp; takeaways</a:t>
-            </a:r>
+            <a:endParaRPr lang="en-CA"/>
           </a:p>
         </p:txBody>
       </p:sp>
       <p:sp>
         <p:nvSpPr>
-          <p:cNvPr id="4" name="Slide Number Placeholder 3">
+          <p:cNvPr id="11" name="Slide Number Placeholder 3">
             <a:extLst>
               <a:ext uri="{FF2B5EF4-FFF2-40B4-BE49-F238E27FC236}">
-                <a16:creationId xmlns:a16="http://schemas.microsoft.com/office/drawing/2014/main" id="{18D5CFA2-4E67-F157-5FFD-A246307D41F7}"/>
+                <a16:creationId xmlns:a16="http://schemas.microsoft.com/office/drawing/2014/main" id="{313D9F49-1E26-17C5-E1C3-5EF1F553D609}"/>
               </a:ext>
             </a:extLst>
           </p:cNvPr>
@@ -19517,19 +16973,72 @@
           <a:bodyPr/>
           <a:lstStyle/>
           <a:p>
+            <a:pPr>
+              <a:spcAft>
+                <a:spcPts val="600"/>
+              </a:spcAft>
+            </a:pPr>
             <a:fld id="{48F63A3B-78C7-47BE-AE5E-E10140E04643}" type="slidenum">
               <a:rPr lang="en-US" smtClean="0"/>
-              <a:pPr/>
+              <a:pPr>
+                <a:spcAft>
+                  <a:spcPts val="600"/>
+                </a:spcAft>
+              </a:pPr>
               <a:t>2</a:t>
             </a:fld>
-            <a:endParaRPr lang="en-US" dirty="0"/>
+            <a:endParaRPr lang="en-US"/>
+          </a:p>
+        </p:txBody>
+      </p:sp>
+      <p:sp>
+        <p:nvSpPr>
+          <p:cNvPr id="4" name="Slide Number Placeholder 3" hidden="1">
+            <a:extLst>
+              <a:ext uri="{FF2B5EF4-FFF2-40B4-BE49-F238E27FC236}">
+                <a16:creationId xmlns:a16="http://schemas.microsoft.com/office/drawing/2014/main" id="{B2917718-D471-9EB4-4FAA-2A8ED4571802}"/>
+              </a:ext>
+            </a:extLst>
+          </p:cNvPr>
+          <p:cNvSpPr>
+            <a:spLocks noGrp="1"/>
+          </p:cNvSpPr>
+          <p:nvPr>
+            <p:ph type="sldNum" sz="quarter" idx="4294967295"/>
+          </p:nvPr>
+        </p:nvSpPr>
+        <p:spPr>
+          <a:xfrm>
+            <a:off x="10358437" y="457199"/>
+            <a:ext cx="1067589" cy="471489"/>
+          </a:xfrm>
+        </p:spPr>
+        <p:txBody>
+          <a:bodyPr/>
+          <a:lstStyle/>
+          <a:p>
+            <a:pPr>
+              <a:spcAft>
+                <a:spcPts val="600"/>
+              </a:spcAft>
+            </a:pPr>
+            <a:fld id="{48F63A3B-78C7-47BE-AE5E-E10140E04643}" type="slidenum">
+              <a:rPr lang="en-US" smtClean="0"/>
+              <a:pPr>
+                <a:spcAft>
+                  <a:spcPts val="600"/>
+                </a:spcAft>
+              </a:pPr>
+              <a:t>2</a:t>
+            </a:fld>
+            <a:endParaRPr lang="en-US"/>
           </a:p>
         </p:txBody>
       </p:sp>
     </p:spTree>
     <p:extLst>
       <p:ext uri="{BB962C8B-B14F-4D97-AF65-F5344CB8AC3E}">
-        <p14:creationId xmlns:p14="http://schemas.microsoft.com/office/powerpoint/2010/main" val="3913219759"/>
+        <p14:creationId xmlns:p14="http://schemas.microsoft.com/office/powerpoint/2010/main" val="315004484"/>
       </p:ext>
     </p:extLst>
   </p:cSld>
@@ -19561,7 +17070,7 @@
           <p:cNvPr id="2" name="Title 1">
             <a:extLst>
               <a:ext uri="{FF2B5EF4-FFF2-40B4-BE49-F238E27FC236}">
-                <a16:creationId xmlns:a16="http://schemas.microsoft.com/office/drawing/2014/main" id="{D54EDA75-0988-2AC2-87F8-8DEC83A7B9CA}"/>
+                <a16:creationId xmlns:a16="http://schemas.microsoft.com/office/drawing/2014/main" id="{A17BB9E8-F528-E023-928E-05035FF5BA3F}"/>
               </a:ext>
             </a:extLst>
           </p:cNvPr>
@@ -19574,61 +17083,188 @@
         </p:nvSpPr>
         <p:spPr>
           <a:xfrm>
-            <a:off x="5702441" y="1061623"/>
-            <a:ext cx="5723586" cy="4739104"/>
+            <a:off x="758952" y="758952"/>
+            <a:ext cx="3932237" cy="1524662"/>
           </a:xfrm>
         </p:spPr>
         <p:txBody>
-          <a:bodyPr/>
+          <a:bodyPr anchor="b">
+            <a:normAutofit/>
+          </a:bodyPr>
           <a:lstStyle/>
           <a:p>
             <a:r>
-              <a:rPr lang="en-US" dirty="0"/>
-              <a:t>The power of communication</a:t>
+              <a:rPr lang="en-CA" dirty="0"/>
+              <a:t>The makerspace</a:t>
             </a:r>
+          </a:p>
+        </p:txBody>
+      </p:sp>
+      <p:sp>
+        <p:nvSpPr>
+          <p:cNvPr id="5" name="Slide Number Placeholder 4">
+            <a:extLst>
+              <a:ext uri="{FF2B5EF4-FFF2-40B4-BE49-F238E27FC236}">
+                <a16:creationId xmlns:a16="http://schemas.microsoft.com/office/drawing/2014/main" id="{07E19435-02AD-73EC-68ED-5FB9AAABDB9A}"/>
+              </a:ext>
+            </a:extLst>
+          </p:cNvPr>
+          <p:cNvSpPr>
+            <a:spLocks noGrp="1"/>
+          </p:cNvSpPr>
+          <p:nvPr>
+            <p:ph type="sldNum" sz="quarter" idx="12"/>
+          </p:nvPr>
+        </p:nvSpPr>
+        <p:spPr>
+          <a:xfrm>
+            <a:off x="10438475" y="457199"/>
+            <a:ext cx="987552" cy="244503"/>
+          </a:xfrm>
+        </p:spPr>
+        <p:txBody>
+          <a:bodyPr anchor="ctr">
+            <a:normAutofit/>
+          </a:bodyPr>
+          <a:lstStyle/>
+          <a:p>
+            <a:pPr>
+              <a:lnSpc>
+                <a:spcPct val="90000"/>
+              </a:lnSpc>
+              <a:spcAft>
+                <a:spcPts val="600"/>
+              </a:spcAft>
+            </a:pPr>
+            <a:fld id="{48F63A3B-78C7-47BE-AE5E-E10140E04643}" type="slidenum">
+              <a:rPr lang="en-US" sz="1100" smtClean="0"/>
+              <a:pPr>
+                <a:lnSpc>
+                  <a:spcPct val="90000"/>
+                </a:lnSpc>
+                <a:spcAft>
+                  <a:spcPts val="600"/>
+                </a:spcAft>
+              </a:pPr>
+              <a:t>3</a:t>
+            </a:fld>
+            <a:endParaRPr lang="en-US" sz="1100"/>
+          </a:p>
+        </p:txBody>
+      </p:sp>
+      <p:sp>
+        <p:nvSpPr>
+          <p:cNvPr id="3" name="Content Placeholder 2">
+            <a:extLst>
+              <a:ext uri="{FF2B5EF4-FFF2-40B4-BE49-F238E27FC236}">
+                <a16:creationId xmlns:a16="http://schemas.microsoft.com/office/drawing/2014/main" id="{8D789106-1175-1A1B-69A4-14FB7D71EEFA}"/>
+              </a:ext>
+            </a:extLst>
+          </p:cNvPr>
+          <p:cNvSpPr>
+            <a:spLocks noGrp="1"/>
+          </p:cNvSpPr>
+          <p:nvPr>
+            <p:ph type="body" sz="half" idx="2"/>
+          </p:nvPr>
+        </p:nvSpPr>
+        <p:spPr>
+          <a:xfrm>
+            <a:off x="758952" y="2286000"/>
+            <a:ext cx="3932237" cy="3567086"/>
+          </a:xfrm>
+        </p:spPr>
+        <p:txBody>
+          <a:bodyPr>
+            <a:normAutofit/>
+          </a:bodyPr>
+          <a:lstStyle/>
+          <a:p>
+            <a:pPr marL="342900" indent="-342900">
+              <a:buFont typeface="Arial" panose="020B0604020202020204" pitchFamily="34" charset="0"/>
+              <a:buChar char="•"/>
+            </a:pPr>
+            <a:r>
+              <a:rPr lang="en-US"/>
+              <a:t>Most engineering-design courses require students to manufacture items for their projects</a:t>
+            </a:r>
+          </a:p>
+          <a:p>
+            <a:pPr marL="342900" indent="-342900">
+              <a:buFont typeface="Arial" panose="020B0604020202020204" pitchFamily="34" charset="0"/>
+              <a:buChar char="•"/>
+            </a:pPr>
+            <a:r>
+              <a:rPr lang="en-US"/>
+              <a:t>The Makerspace offers a fleet of 3D printers, free for all enrolled engineering students</a:t>
+            </a:r>
+          </a:p>
+          <a:p>
+            <a:pPr marL="342900" indent="-342900">
+              <a:buFont typeface="Arial" panose="020B0604020202020204" pitchFamily="34" charset="0"/>
+              <a:buChar char="•"/>
+            </a:pPr>
+            <a:r>
+              <a:rPr lang="en-US"/>
+              <a:t>Accessible on a “First-Come, First-Served” basis from 10am-6pm</a:t>
+            </a:r>
+          </a:p>
+          <a:p>
+            <a:pPr marL="342900" indent="-342900">
+              <a:buFont typeface="Arial" panose="020B0604020202020204" pitchFamily="34" charset="0"/>
+              <a:buChar char="•"/>
+            </a:pPr>
+            <a:r>
+              <a:rPr lang="en-GB"/>
+              <a:t>Individual components can take a few minutes up to an entire day</a:t>
+            </a:r>
+            <a:endParaRPr lang="en-CA" dirty="0"/>
           </a:p>
         </p:txBody>
       </p:sp>
       <p:pic>
         <p:nvPicPr>
-          <p:cNvPr id="7" name="Picture Placeholder 6" descr="A person standing in front of a whiteboard">
+          <p:cNvPr id="1028" name="Picture 4" descr="Visited this amazing #makerspace at @genie_engineering_uottawa @uottawa ...">
             <a:extLst>
               <a:ext uri="{FF2B5EF4-FFF2-40B4-BE49-F238E27FC236}">
-                <a16:creationId xmlns:a16="http://schemas.microsoft.com/office/drawing/2014/main" id="{DD186EAB-37C7-E7E6-AE8D-F077D02804F9}"/>
+                <a16:creationId xmlns:a16="http://schemas.microsoft.com/office/drawing/2014/main" id="{E1017691-B819-2127-39E5-CBD539236BFA}"/>
               </a:ext>
             </a:extLst>
           </p:cNvPr>
           <p:cNvPicPr>
-            <a:picLocks noGrp="1" noChangeAspect="1"/>
+            <a:picLocks noChangeAspect="1" noChangeArrowheads="1"/>
           </p:cNvPicPr>
-          <p:nvPr>
-            <p:ph type="pic" sz="quarter" idx="11"/>
-          </p:nvPr>
+          <p:nvPr/>
         </p:nvPicPr>
         <p:blipFill>
-          <a:blip r:embed="rId3">
-            <a:duotone>
-              <a:prstClr val="black"/>
-              <a:schemeClr val="accent1">
-                <a:tint val="45000"/>
-                <a:satMod val="400000"/>
-              </a:schemeClr>
-            </a:duotone>
+          <a:blip r:embed="rId2">
+            <a:extLst>
+              <a:ext uri="{28A0092B-C50C-407E-A947-70E740481C1C}">
+                <a14:useLocalDpi xmlns:a14="http://schemas.microsoft.com/office/drawing/2010/main" val="0"/>
+              </a:ext>
+            </a:extLst>
           </a:blip>
-          <a:srcRect l="27208" r="27208"/>
-          <a:stretch/>
+          <a:stretch>
+            <a:fillRect/>
+          </a:stretch>
         </p:blipFill>
-        <p:spPr>
+        <p:spPr bwMode="auto">
           <a:xfrm>
-            <a:off x="443345" y="0"/>
-            <a:ext cx="4344695" cy="6359525"/>
+            <a:off x="5744810" y="741459"/>
+            <a:ext cx="5119592" cy="5119592"/>
           </a:xfrm>
+          <a:prstGeom prst="rect">
+            <a:avLst/>
+          </a:prstGeom>
+          <a:solidFill>
+            <a:srgbClr val="FFFFFF"/>
+          </a:solidFill>
         </p:spPr>
       </p:pic>
     </p:spTree>
     <p:extLst>
       <p:ext uri="{BB962C8B-B14F-4D97-AF65-F5344CB8AC3E}">
-        <p14:creationId xmlns:p14="http://schemas.microsoft.com/office/powerpoint/2010/main" val="2906491918"/>
+        <p14:creationId xmlns:p14="http://schemas.microsoft.com/office/powerpoint/2010/main" val="755491312"/>
       </p:ext>
     </p:extLst>
   </p:cSld>
@@ -19657,10 +17293,10 @@
       </p:grpSpPr>
       <p:sp>
         <p:nvSpPr>
-          <p:cNvPr id="2" name="Title 1">
+          <p:cNvPr id="27" name="Title 1">
             <a:extLst>
               <a:ext uri="{FF2B5EF4-FFF2-40B4-BE49-F238E27FC236}">
-                <a16:creationId xmlns:a16="http://schemas.microsoft.com/office/drawing/2014/main" id="{D53B219B-7E3A-7E84-6386-37313F0CFB09}"/>
+                <a16:creationId xmlns:a16="http://schemas.microsoft.com/office/drawing/2014/main" id="{8199AC89-5D0C-E350-D77E-1760F76C9EDA}"/>
               </a:ext>
             </a:extLst>
           </p:cNvPr>
@@ -19673,8 +17309,8 @@
         </p:nvSpPr>
         <p:spPr>
           <a:xfrm>
-            <a:off x="914400" y="1057275"/>
-            <a:ext cx="5259554" cy="2495028"/>
+            <a:off x="914400" y="1057274"/>
+            <a:ext cx="10511627" cy="1012785"/>
           </a:xfrm>
         </p:spPr>
         <p:txBody>
@@ -19682,201 +17318,19 @@
           <a:lstStyle/>
           <a:p>
             <a:r>
-              <a:rPr lang="en-US" dirty="0"/>
-              <a:t>Overcoming nervousness</a:t>
+              <a:rPr lang="en-US" b="0" dirty="0"/>
+              <a:t>Output Parameters To Be Observed</a:t>
             </a:r>
+            <a:endParaRPr lang="en-US" dirty="0"/>
           </a:p>
         </p:txBody>
       </p:sp>
       <p:sp>
         <p:nvSpPr>
-          <p:cNvPr id="3" name="Text Placeholder 2">
+          <p:cNvPr id="4" name="Slide Number Placeholder 3">
             <a:extLst>
               <a:ext uri="{FF2B5EF4-FFF2-40B4-BE49-F238E27FC236}">
-                <a16:creationId xmlns:a16="http://schemas.microsoft.com/office/drawing/2014/main" id="{A2E339BF-E6D7-DD0E-AF02-6813852EE723}"/>
-              </a:ext>
-            </a:extLst>
-          </p:cNvPr>
-          <p:cNvSpPr>
-            <a:spLocks noGrp="1"/>
-          </p:cNvSpPr>
-          <p:nvPr>
-            <p:ph idx="1"/>
-          </p:nvPr>
-        </p:nvSpPr>
-        <p:spPr>
-          <a:xfrm>
-            <a:off x="914400" y="3808750"/>
-            <a:ext cx="5259554" cy="2233233"/>
-          </a:xfrm>
-        </p:spPr>
-        <p:txBody>
-          <a:bodyPr/>
-          <a:lstStyle/>
-          <a:p>
-            <a:r>
-              <a:rPr lang="en-US" dirty="0"/>
-              <a:t>Confidence-building strategies</a:t>
-            </a:r>
-          </a:p>
-        </p:txBody>
-      </p:sp>
-      <p:pic>
-        <p:nvPicPr>
-          <p:cNvPr id="6" name="Picture Placeholder 5" descr="A person holding a microphone and standing in front of a group of people">
-            <a:extLst>
-              <a:ext uri="{FF2B5EF4-FFF2-40B4-BE49-F238E27FC236}">
-                <a16:creationId xmlns:a16="http://schemas.microsoft.com/office/drawing/2014/main" id="{FECDA901-DD88-89EB-E10E-A2994D0A92DB}"/>
-              </a:ext>
-            </a:extLst>
-          </p:cNvPr>
-          <p:cNvPicPr>
-            <a:picLocks noGrp="1" noChangeAspect="1"/>
-          </p:cNvPicPr>
-          <p:nvPr>
-            <p:ph type="pic" sz="quarter" idx="11"/>
-          </p:nvPr>
-        </p:nvPicPr>
-        <p:blipFill rotWithShape="1">
-          <a:blip r:embed="rId3">
-            <a:duotone>
-              <a:prstClr val="black"/>
-              <a:schemeClr val="accent3">
-                <a:tint val="45000"/>
-                <a:satMod val="400000"/>
-              </a:schemeClr>
-            </a:duotone>
-          </a:blip>
-          <a:srcRect l="27745" r="27745"/>
-          <a:stretch/>
-        </p:blipFill>
-        <p:spPr>
-          <a:xfrm>
-            <a:off x="7414194" y="410780"/>
-            <a:ext cx="4344695" cy="6447220"/>
-          </a:xfrm>
-        </p:spPr>
-      </p:pic>
-    </p:spTree>
-    <p:extLst>
-      <p:ext uri="{BB962C8B-B14F-4D97-AF65-F5344CB8AC3E}">
-        <p14:creationId xmlns:p14="http://schemas.microsoft.com/office/powerpoint/2010/main" val="2952923800"/>
-      </p:ext>
-    </p:extLst>
-  </p:cSld>
-  <p:clrMapOvr>
-    <a:masterClrMapping/>
-  </p:clrMapOvr>
-</p:sld>
-</file>
-
-<file path=ppt/slides/slide5.xml><?xml version="1.0" encoding="utf-8"?>
-<p:sld xmlns:a="http://schemas.openxmlformats.org/drawingml/2006/main" xmlns:r="http://schemas.openxmlformats.org/officeDocument/2006/relationships" xmlns:p="http://schemas.openxmlformats.org/presentationml/2006/main">
-  <p:cSld>
-    <p:spTree>
-      <p:nvGrpSpPr>
-        <p:cNvPr id="1" name=""/>
-        <p:cNvGrpSpPr/>
-        <p:nvPr/>
-      </p:nvGrpSpPr>
-      <p:grpSpPr>
-        <a:xfrm>
-          <a:off x="0" y="0"/>
-          <a:ext cx="0" cy="0"/>
-          <a:chOff x="0" y="0"/>
-          <a:chExt cx="0" cy="0"/>
-        </a:xfrm>
-      </p:grpSpPr>
-      <p:sp>
-        <p:nvSpPr>
-          <p:cNvPr id="2" name="Title 1">
-            <a:extLst>
-              <a:ext uri="{FF2B5EF4-FFF2-40B4-BE49-F238E27FC236}">
-                <a16:creationId xmlns:a16="http://schemas.microsoft.com/office/drawing/2014/main" id="{FD5E8954-9BCB-7FD9-A210-38DC54382D45}"/>
-              </a:ext>
-            </a:extLst>
-          </p:cNvPr>
-          <p:cNvSpPr>
-            <a:spLocks noGrp="1"/>
-          </p:cNvSpPr>
-          <p:nvPr>
-            <p:ph type="title"/>
-          </p:nvPr>
-        </p:nvSpPr>
-        <p:spPr>
-          <a:xfrm>
-            <a:off x="3460565" y="1057274"/>
-            <a:ext cx="7965461" cy="994164"/>
-          </a:xfrm>
-        </p:spPr>
-        <p:txBody>
-          <a:bodyPr/>
-          <a:lstStyle/>
-          <a:p>
-            <a:r>
-              <a:rPr lang="en-US" dirty="0"/>
-              <a:t>Engaging the audience</a:t>
-            </a:r>
-          </a:p>
-        </p:txBody>
-      </p:sp>
-      <p:sp>
-        <p:nvSpPr>
-          <p:cNvPr id="3" name="Content Placeholder 2">
-            <a:extLst>
-              <a:ext uri="{FF2B5EF4-FFF2-40B4-BE49-F238E27FC236}">
-                <a16:creationId xmlns:a16="http://schemas.microsoft.com/office/drawing/2014/main" id="{75111C33-898C-4414-4665-5136EB6FC126}"/>
-              </a:ext>
-            </a:extLst>
-          </p:cNvPr>
-          <p:cNvSpPr>
-            <a:spLocks noGrp="1"/>
-          </p:cNvSpPr>
-          <p:nvPr>
-            <p:ph sz="half" idx="2"/>
-          </p:nvPr>
-        </p:nvSpPr>
-        <p:spPr>
-          <a:xfrm>
-            <a:off x="3460565" y="2303029"/>
-            <a:ext cx="7965460" cy="3497698"/>
-          </a:xfrm>
-        </p:spPr>
-        <p:txBody>
-          <a:bodyPr/>
-          <a:lstStyle/>
-          <a:p>
-            <a:r>
-              <a:rPr lang="en-US" dirty="0"/>
-              <a:t>Make eye contact with your audience to create a sense of intimacy and involvement</a:t>
-            </a:r>
-          </a:p>
-          <a:p>
-            <a:r>
-              <a:rPr lang="en-US" dirty="0"/>
-              <a:t>Weave relatable stories into your presentation using narratives that make your message memorable and impactful</a:t>
-            </a:r>
-          </a:p>
-          <a:p>
-            <a:r>
-              <a:rPr lang="en-US" dirty="0"/>
-              <a:t>Encourage questions and provide thoughtful responses to enhance audience participation</a:t>
-            </a:r>
-          </a:p>
-          <a:p>
-            <a:r>
-              <a:rPr lang="en-US" dirty="0"/>
-              <a:t>Use live polls or surveys to gather audience opinions, promoting engagement and making sure the audience feel involved</a:t>
-            </a:r>
-          </a:p>
-        </p:txBody>
-      </p:sp>
-      <p:sp>
-        <p:nvSpPr>
-          <p:cNvPr id="23" name="Slide Number Placeholder 22">
-            <a:extLst>
-              <a:ext uri="{FF2B5EF4-FFF2-40B4-BE49-F238E27FC236}">
-                <a16:creationId xmlns:a16="http://schemas.microsoft.com/office/drawing/2014/main" id="{94FF72B7-0438-3641-5939-75128934B0DF}"/>
+                <a16:creationId xmlns:a16="http://schemas.microsoft.com/office/drawing/2014/main" id="{90766DF9-C894-632E-8E1F-10A793DE5CDC}"/>
               </a:ext>
             </a:extLst>
           </p:cNvPr>
@@ -19894,798 +17348,710 @@
           </a:xfrm>
         </p:spPr>
         <p:txBody>
-          <a:bodyPr/>
-          <a:lstStyle/>
-          <a:p>
-            <a:fld id="{48F63A3B-78C7-47BE-AE5E-E10140E04643}" type="slidenum">
-              <a:rPr lang="en-US" smtClean="0"/>
-              <a:pPr/>
-              <a:t>5</a:t>
-            </a:fld>
-            <a:endParaRPr lang="en-US" dirty="0"/>
-          </a:p>
-        </p:txBody>
-      </p:sp>
-    </p:spTree>
-    <p:extLst>
-      <p:ext uri="{BB962C8B-B14F-4D97-AF65-F5344CB8AC3E}">
-        <p14:creationId xmlns:p14="http://schemas.microsoft.com/office/powerpoint/2010/main" val="685681062"/>
-      </p:ext>
-    </p:extLst>
-  </p:cSld>
-  <p:clrMapOvr>
-    <a:masterClrMapping/>
-  </p:clrMapOvr>
-</p:sld>
-</file>
-
-<file path=ppt/slides/slide6.xml><?xml version="1.0" encoding="utf-8"?>
-<p:sld xmlns:a="http://schemas.openxmlformats.org/drawingml/2006/main" xmlns:r="http://schemas.openxmlformats.org/officeDocument/2006/relationships" xmlns:p="http://schemas.openxmlformats.org/presentationml/2006/main">
-  <p:cSld>
-    <p:spTree>
-      <p:nvGrpSpPr>
-        <p:cNvPr id="1" name=""/>
-        <p:cNvGrpSpPr/>
-        <p:nvPr/>
-      </p:nvGrpSpPr>
-      <p:grpSpPr>
-        <a:xfrm>
-          <a:off x="0" y="0"/>
-          <a:ext cx="0" cy="0"/>
-          <a:chOff x="0" y="0"/>
-          <a:chExt cx="0" cy="0"/>
-        </a:xfrm>
-      </p:grpSpPr>
-      <p:sp>
-        <p:nvSpPr>
-          <p:cNvPr id="2" name="Title 1">
-            <a:extLst>
-              <a:ext uri="{FF2B5EF4-FFF2-40B4-BE49-F238E27FC236}">
-                <a16:creationId xmlns:a16="http://schemas.microsoft.com/office/drawing/2014/main" id="{B6210199-C129-11F0-56F2-2D1AED21CB4C}"/>
-              </a:ext>
-            </a:extLst>
-          </p:cNvPr>
-          <p:cNvSpPr>
-            <a:spLocks noGrp="1"/>
-          </p:cNvSpPr>
-          <p:nvPr>
-            <p:ph type="title"/>
-          </p:nvPr>
-        </p:nvSpPr>
-        <p:spPr>
-          <a:xfrm>
-            <a:off x="4364809" y="1057274"/>
-            <a:ext cx="7043617" cy="2520217"/>
-          </a:xfrm>
-        </p:spPr>
-        <p:txBody>
-          <a:bodyPr/>
-          <a:lstStyle/>
-          <a:p>
-            <a:r>
-              <a:rPr lang="en-US" dirty="0"/>
-              <a:t>Selecting </a:t>
-            </a:r>
-            <a:br>
-              <a:rPr lang="en-US" dirty="0"/>
-            </a:br>
-            <a:r>
-              <a:rPr lang="en-US" dirty="0"/>
-              <a:t>visual aids</a:t>
-            </a:r>
-          </a:p>
-        </p:txBody>
-      </p:sp>
-      <p:sp>
-        <p:nvSpPr>
-          <p:cNvPr id="3" name="Slide Number Placeholder 2">
-            <a:extLst>
-              <a:ext uri="{FF2B5EF4-FFF2-40B4-BE49-F238E27FC236}">
-                <a16:creationId xmlns:a16="http://schemas.microsoft.com/office/drawing/2014/main" id="{370AEC4F-E711-8552-9C34-82C1514A1E37}"/>
-              </a:ext>
-            </a:extLst>
-          </p:cNvPr>
-          <p:cNvSpPr>
-            <a:spLocks noGrp="1"/>
-          </p:cNvSpPr>
-          <p:nvPr>
-            <p:ph type="sldNum" sz="quarter" idx="10"/>
-          </p:nvPr>
-        </p:nvSpPr>
-        <p:spPr>
-          <a:xfrm>
-            <a:off x="10438475" y="457199"/>
-            <a:ext cx="987552" cy="471489"/>
-          </a:xfrm>
-        </p:spPr>
-        <p:txBody>
-          <a:bodyPr/>
-          <a:lstStyle/>
-          <a:p>
-            <a:fld id="{48F63A3B-78C7-47BE-AE5E-E10140E04643}" type="slidenum">
-              <a:rPr lang="en-US" smtClean="0"/>
-              <a:pPr/>
-              <a:t>6</a:t>
-            </a:fld>
-            <a:endParaRPr lang="en-US" dirty="0"/>
-          </a:p>
-        </p:txBody>
-      </p:sp>
-      <p:sp>
-        <p:nvSpPr>
-          <p:cNvPr id="4" name="Content Placeholder 3">
-            <a:extLst>
-              <a:ext uri="{FF2B5EF4-FFF2-40B4-BE49-F238E27FC236}">
-                <a16:creationId xmlns:a16="http://schemas.microsoft.com/office/drawing/2014/main" id="{BDDD6BDC-E008-6AB7-55A1-46ED9BCF054F}"/>
-              </a:ext>
-            </a:extLst>
-          </p:cNvPr>
-          <p:cNvSpPr>
-            <a:spLocks noGrp="1"/>
-          </p:cNvSpPr>
-          <p:nvPr>
-            <p:ph idx="11"/>
-          </p:nvPr>
-        </p:nvSpPr>
-        <p:spPr>
-          <a:xfrm>
-            <a:off x="4364808" y="3808750"/>
-            <a:ext cx="7043618" cy="2233233"/>
-          </a:xfrm>
-        </p:spPr>
-        <p:txBody>
-          <a:bodyPr/>
-          <a:lstStyle/>
-          <a:p>
-            <a:r>
-              <a:rPr lang="en-US" dirty="0"/>
-              <a:t>Enhancing your presentation</a:t>
-            </a:r>
-          </a:p>
-        </p:txBody>
-      </p:sp>
-    </p:spTree>
-    <p:extLst>
-      <p:ext uri="{BB962C8B-B14F-4D97-AF65-F5344CB8AC3E}">
-        <p14:creationId xmlns:p14="http://schemas.microsoft.com/office/powerpoint/2010/main" val="1131718056"/>
-      </p:ext>
-    </p:extLst>
-  </p:cSld>
-  <p:clrMapOvr>
-    <a:masterClrMapping/>
-  </p:clrMapOvr>
-</p:sld>
-</file>
-
-<file path=ppt/slides/slide7.xml><?xml version="1.0" encoding="utf-8"?>
-<p:sld xmlns:a="http://schemas.openxmlformats.org/drawingml/2006/main" xmlns:r="http://schemas.openxmlformats.org/officeDocument/2006/relationships" xmlns:p="http://schemas.openxmlformats.org/presentationml/2006/main">
-  <p:cSld>
-    <p:spTree>
-      <p:nvGrpSpPr>
-        <p:cNvPr id="1" name=""/>
-        <p:cNvGrpSpPr/>
-        <p:nvPr/>
-      </p:nvGrpSpPr>
-      <p:grpSpPr>
-        <a:xfrm>
-          <a:off x="0" y="0"/>
-          <a:ext cx="0" cy="0"/>
-          <a:chOff x="0" y="0"/>
-          <a:chExt cx="0" cy="0"/>
-        </a:xfrm>
-      </p:grpSpPr>
-      <p:sp>
-        <p:nvSpPr>
-          <p:cNvPr id="2" name="Title 1">
-            <a:extLst>
-              <a:ext uri="{FF2B5EF4-FFF2-40B4-BE49-F238E27FC236}">
-                <a16:creationId xmlns:a16="http://schemas.microsoft.com/office/drawing/2014/main" id="{B28A34A6-22BC-27A4-2C79-EE98A4943B14}"/>
-              </a:ext>
-            </a:extLst>
-          </p:cNvPr>
-          <p:cNvSpPr>
-            <a:spLocks noGrp="1"/>
-          </p:cNvSpPr>
-          <p:nvPr>
-            <p:ph type="title"/>
-          </p:nvPr>
-        </p:nvSpPr>
-        <p:spPr>
-          <a:xfrm>
-            <a:off x="914399" y="834635"/>
-            <a:ext cx="7796464" cy="1222385"/>
-          </a:xfrm>
-        </p:spPr>
-        <p:txBody>
-          <a:bodyPr/>
-          <a:lstStyle/>
-          <a:p>
-            <a:r>
-              <a:rPr lang="en-US" dirty="0"/>
-              <a:t>Effective delivery techniques</a:t>
-            </a:r>
-          </a:p>
-        </p:txBody>
-      </p:sp>
-      <p:sp>
-        <p:nvSpPr>
-          <p:cNvPr id="3" name="Slide Number Placeholder 2">
-            <a:extLst>
-              <a:ext uri="{FF2B5EF4-FFF2-40B4-BE49-F238E27FC236}">
-                <a16:creationId xmlns:a16="http://schemas.microsoft.com/office/drawing/2014/main" id="{7267C004-8B72-C872-98FB-00A2A584D055}"/>
-              </a:ext>
-            </a:extLst>
-          </p:cNvPr>
-          <p:cNvSpPr>
-            <a:spLocks noGrp="1"/>
-          </p:cNvSpPr>
-          <p:nvPr>
-            <p:ph type="sldNum" sz="quarter" idx="10"/>
-          </p:nvPr>
-        </p:nvSpPr>
-        <p:spPr>
-          <a:xfrm>
-            <a:off x="10438475" y="457199"/>
-            <a:ext cx="987552" cy="471489"/>
-          </a:xfrm>
-        </p:spPr>
-        <p:txBody>
-          <a:bodyPr/>
-          <a:lstStyle/>
-          <a:p>
-            <a:fld id="{48F63A3B-78C7-47BE-AE5E-E10140E04643}" type="slidenum">
-              <a:rPr lang="en-US" smtClean="0"/>
-              <a:pPr/>
-              <a:t>7</a:t>
-            </a:fld>
-            <a:endParaRPr lang="en-US" dirty="0"/>
-          </a:p>
-        </p:txBody>
-      </p:sp>
-      <p:sp>
-        <p:nvSpPr>
-          <p:cNvPr id="16" name="Content Placeholder 4">
-            <a:extLst>
-              <a:ext uri="{FF2B5EF4-FFF2-40B4-BE49-F238E27FC236}">
-                <a16:creationId xmlns:a16="http://schemas.microsoft.com/office/drawing/2014/main" id="{AEF9954A-E263-8A7E-58B1-4D03F7D1BD9B}"/>
-              </a:ext>
-            </a:extLst>
-          </p:cNvPr>
-          <p:cNvSpPr>
-            <a:spLocks noGrp="1"/>
-          </p:cNvSpPr>
-          <p:nvPr>
-            <p:ph sz="half" idx="2"/>
-          </p:nvPr>
-        </p:nvSpPr>
-        <p:spPr>
-          <a:xfrm>
-            <a:off x="914400" y="2303028"/>
-            <a:ext cx="3283119" cy="3720337"/>
-          </a:xfrm>
-        </p:spPr>
-        <p:txBody>
-          <a:bodyPr>
+          <a:bodyPr anchor="ctr">
             <a:normAutofit/>
           </a:bodyPr>
           <a:lstStyle/>
           <a:p>
-            <a:r>
-              <a:rPr lang="en-US" dirty="0"/>
-              <a:t>This is a powerful tool in public speaking. It involves varying pitch, tone, and volume to convey emotion, emphasize points, and maintain interest. </a:t>
-            </a:r>
-          </a:p>
-          <a:p>
-            <a:pPr lvl="1"/>
-            <a:r>
-              <a:rPr lang="en-US" dirty="0"/>
-              <a:t>Pitch variation</a:t>
-            </a:r>
-          </a:p>
-          <a:p>
-            <a:pPr lvl="1"/>
-            <a:r>
-              <a:rPr lang="en-US" dirty="0"/>
-              <a:t>Tone inflection</a:t>
-            </a:r>
-          </a:p>
-          <a:p>
-            <a:pPr lvl="1"/>
-            <a:r>
-              <a:rPr lang="en-US" dirty="0"/>
-              <a:t>Volume control</a:t>
-            </a:r>
+            <a:pPr>
+              <a:spcAft>
+                <a:spcPts val="600"/>
+              </a:spcAft>
+            </a:pPr>
+            <a:fld id="{48F63A3B-78C7-47BE-AE5E-E10140E04643}" type="slidenum">
+              <a:rPr lang="en-US" smtClean="0"/>
+              <a:pPr>
+                <a:spcAft>
+                  <a:spcPts val="600"/>
+                </a:spcAft>
+              </a:pPr>
+              <a:t>4</a:t>
+            </a:fld>
+            <a:endParaRPr lang="en-US"/>
           </a:p>
         </p:txBody>
       </p:sp>
-      <p:sp>
-        <p:nvSpPr>
-          <p:cNvPr id="17" name="Content Placeholder 6">
+      <p:graphicFrame>
+        <p:nvGraphicFramePr>
+          <p:cNvPr id="8" name="Content Placeholder 7">
             <a:extLst>
               <a:ext uri="{FF2B5EF4-FFF2-40B4-BE49-F238E27FC236}">
-                <a16:creationId xmlns:a16="http://schemas.microsoft.com/office/drawing/2014/main" id="{33680A80-5C61-DD02-1119-0565C0AD5372}"/>
+                <a16:creationId xmlns:a16="http://schemas.microsoft.com/office/drawing/2014/main" id="{48529A3A-5DDF-23E3-20C2-CC59234B2818}"/>
               </a:ext>
             </a:extLst>
           </p:cNvPr>
-          <p:cNvSpPr>
-            <a:spLocks noGrp="1"/>
-          </p:cNvSpPr>
+          <p:cNvGraphicFramePr>
+            <a:graphicFrameLocks noGrp="1"/>
+          </p:cNvGraphicFramePr>
           <p:nvPr>
             <p:ph sz="quarter" idx="4"/>
+            <p:extLst>
+              <p:ext uri="{D42A27DB-BD31-4B8C-83A1-F6EECF244321}">
+                <p14:modId xmlns:p14="http://schemas.microsoft.com/office/powerpoint/2010/main" val="3561842753"/>
+              </p:ext>
+            </p:extLst>
           </p:nvPr>
-        </p:nvSpPr>
-        <p:spPr>
-          <a:xfrm>
-            <a:off x="4782159" y="2303028"/>
-            <a:ext cx="3284951" cy="3720337"/>
-          </a:xfrm>
-        </p:spPr>
-        <p:txBody>
-          <a:bodyPr>
-            <a:normAutofit/>
-          </a:bodyPr>
-          <a:lstStyle/>
-          <a:p>
-            <a:r>
-              <a:rPr lang="en-US" dirty="0"/>
-              <a:t>Effective body language enhances your message, making it more impactful and memorable.</a:t>
-            </a:r>
-          </a:p>
-          <a:p>
-            <a:pPr lvl="1"/>
-            <a:r>
-              <a:rPr lang="en-US" dirty="0"/>
-              <a:t>Meaningful eye contact</a:t>
-            </a:r>
-          </a:p>
-          <a:p>
-            <a:pPr lvl="1"/>
-            <a:r>
-              <a:rPr lang="en-US" dirty="0"/>
-              <a:t>Purposeful gestures</a:t>
-            </a:r>
-          </a:p>
-          <a:p>
-            <a:pPr lvl="1"/>
-            <a:r>
-              <a:rPr lang="en-US" dirty="0"/>
-              <a:t>Maintain good posture</a:t>
-            </a:r>
-          </a:p>
-          <a:p>
-            <a:pPr lvl="1"/>
-            <a:r>
-              <a:rPr lang="en-US" dirty="0"/>
-              <a:t>Control your expressions</a:t>
-            </a:r>
-          </a:p>
-        </p:txBody>
-      </p:sp>
+        </p:nvGraphicFramePr>
+        <p:xfrm>
+          <a:off x="1202043" y="2316067"/>
+          <a:ext cx="9936342" cy="3736390"/>
+        </p:xfrm>
+        <a:graphic>
+          <a:graphicData uri="http://schemas.openxmlformats.org/drawingml/2006/table">
+            <a:tbl>
+              <a:tblPr firstRow="1" bandRow="1">
+                <a:tableStyleId>{8799B23B-EC83-4686-B30A-512413B5E67A}</a:tableStyleId>
+              </a:tblPr>
+              <a:tblGrid>
+                <a:gridCol w="1919548">
+                  <a:extLst>
+                    <a:ext uri="{9D8B030D-6E8A-4147-A177-3AD203B41FA5}">
+                      <a16:colId xmlns:a16="http://schemas.microsoft.com/office/drawing/2014/main" val="2823865637"/>
+                    </a:ext>
+                  </a:extLst>
+                </a:gridCol>
+                <a:gridCol w="2085250">
+                  <a:extLst>
+                    <a:ext uri="{9D8B030D-6E8A-4147-A177-3AD203B41FA5}">
+                      <a16:colId xmlns:a16="http://schemas.microsoft.com/office/drawing/2014/main" val="4188119390"/>
+                    </a:ext>
+                  </a:extLst>
+                </a:gridCol>
+                <a:gridCol w="5931544">
+                  <a:extLst>
+                    <a:ext uri="{9D8B030D-6E8A-4147-A177-3AD203B41FA5}">
+                      <a16:colId xmlns:a16="http://schemas.microsoft.com/office/drawing/2014/main" val="2325668176"/>
+                    </a:ext>
+                  </a:extLst>
+                </a:gridCol>
+              </a:tblGrid>
+              <a:tr h="483102">
+                <a:tc>
+                  <a:txBody>
+                    <a:bodyPr/>
+                    <a:lstStyle/>
+                    <a:p>
+                      <a:pPr algn="ctr" rtl="0" fontAlgn="base">
+                        <a:lnSpc>
+                          <a:spcPts val="1913"/>
+                        </a:lnSpc>
+                        <a:spcAft>
+                          <a:spcPts val="800"/>
+                        </a:spcAft>
+                        <a:buNone/>
+                      </a:pPr>
+                      <a:r>
+                        <a:rPr lang="en-GB" sz="1600" b="0" u="none" strike="noStrike" dirty="0">
+                          <a:solidFill>
+                            <a:srgbClr val="FFFFFF"/>
+                          </a:solidFill>
+                          <a:effectLst/>
+                        </a:rPr>
+                        <a:t>Metric </a:t>
+                      </a:r>
+                      <a:endParaRPr lang="en-GB" sz="3000" b="0" i="0" u="none" strike="noStrike" dirty="0">
+                        <a:effectLst/>
+                        <a:latin typeface="Arial" panose="020B0604020202020204" pitchFamily="34" charset="0"/>
+                      </a:endParaRPr>
+                    </a:p>
+                  </a:txBody>
+                  <a:tcPr marL="93353" marR="93353" marT="46675" marB="46675" anchor="ctr">
+                    <a:solidFill>
+                      <a:schemeClr val="tx2"/>
+                    </a:solidFill>
+                  </a:tcPr>
+                </a:tc>
+                <a:tc>
+                  <a:txBody>
+                    <a:bodyPr/>
+                    <a:lstStyle/>
+                    <a:p>
+                      <a:pPr algn="ctr" rtl="0" fontAlgn="base">
+                        <a:lnSpc>
+                          <a:spcPts val="1913"/>
+                        </a:lnSpc>
+                        <a:spcAft>
+                          <a:spcPts val="800"/>
+                        </a:spcAft>
+                        <a:buNone/>
+                      </a:pPr>
+                      <a:r>
+                        <a:rPr lang="en-GB" sz="1600" b="0" u="none" strike="noStrike" dirty="0">
+                          <a:solidFill>
+                            <a:srgbClr val="FFFFFF"/>
+                          </a:solidFill>
+                          <a:effectLst/>
+                        </a:rPr>
+                        <a:t>Interpretation </a:t>
+                      </a:r>
+                      <a:endParaRPr lang="en-GB" sz="3000" b="0" i="0" u="none" strike="noStrike" dirty="0">
+                        <a:effectLst/>
+                        <a:latin typeface="Arial" panose="020B0604020202020204" pitchFamily="34" charset="0"/>
+                      </a:endParaRPr>
+                    </a:p>
+                  </a:txBody>
+                  <a:tcPr marL="93353" marR="93353" marT="46675" marB="46675" anchor="ctr">
+                    <a:solidFill>
+                      <a:schemeClr val="tx2"/>
+                    </a:solidFill>
+                  </a:tcPr>
+                </a:tc>
+                <a:tc>
+                  <a:txBody>
+                    <a:bodyPr/>
+                    <a:lstStyle/>
+                    <a:p>
+                      <a:pPr algn="ctr" rtl="0" fontAlgn="base">
+                        <a:lnSpc>
+                          <a:spcPts val="1913"/>
+                        </a:lnSpc>
+                        <a:spcAft>
+                          <a:spcPts val="800"/>
+                        </a:spcAft>
+                        <a:buNone/>
+                      </a:pPr>
+                      <a:r>
+                        <a:rPr lang="en-GB" sz="1600" b="0" u="none" strike="noStrike" dirty="0">
+                          <a:solidFill>
+                            <a:srgbClr val="FFFFFF"/>
+                          </a:solidFill>
+                          <a:effectLst/>
+                        </a:rPr>
+                        <a:t>Definition </a:t>
+                      </a:r>
+                      <a:endParaRPr lang="en-GB" sz="3000" b="0" i="0" u="none" strike="noStrike" dirty="0">
+                        <a:effectLst/>
+                        <a:latin typeface="Arial" panose="020B0604020202020204" pitchFamily="34" charset="0"/>
+                      </a:endParaRPr>
+                    </a:p>
+                  </a:txBody>
+                  <a:tcPr marL="93353" marR="93353" marT="46675" marB="46675" anchor="ctr">
+                    <a:solidFill>
+                      <a:schemeClr val="tx2"/>
+                    </a:solidFill>
+                  </a:tcPr>
+                </a:tc>
+                <a:extLst>
+                  <a:ext uri="{0D108BD9-81ED-4DB2-BD59-A6C34878D82A}">
+                    <a16:rowId xmlns:a16="http://schemas.microsoft.com/office/drawing/2014/main" val="2898786160"/>
+                  </a:ext>
+                </a:extLst>
+              </a:tr>
+              <a:tr h="653825">
+                <a:tc>
+                  <a:txBody>
+                    <a:bodyPr/>
+                    <a:lstStyle/>
+                    <a:p>
+                      <a:pPr algn="ctr" rtl="0" fontAlgn="base">
+                        <a:lnSpc>
+                          <a:spcPts val="1275"/>
+                        </a:lnSpc>
+                        <a:spcAft>
+                          <a:spcPts val="800"/>
+                        </a:spcAft>
+                        <a:buNone/>
+                      </a:pPr>
+                      <a:r>
+                        <a:rPr lang="en-GB" sz="1600" b="0" u="none" strike="noStrike" dirty="0">
+                          <a:solidFill>
+                            <a:srgbClr val="595959"/>
+                          </a:solidFill>
+                          <a:effectLst/>
+                        </a:rPr>
+                        <a:t>Arrivals </a:t>
+                      </a:r>
+                      <a:endParaRPr lang="en-GB" sz="3000" b="0" i="0" u="none" strike="noStrike" dirty="0">
+                        <a:effectLst/>
+                        <a:latin typeface="Arial" panose="020B0604020202020204" pitchFamily="34" charset="0"/>
+                      </a:endParaRPr>
+                    </a:p>
+                  </a:txBody>
+                  <a:tcPr marL="93353" marR="93353" marT="46675" marB="46675" anchor="ctr"/>
+                </a:tc>
+                <a:tc>
+                  <a:txBody>
+                    <a:bodyPr/>
+                    <a:lstStyle/>
+                    <a:p>
+                      <a:pPr algn="ctr" rtl="0" fontAlgn="base">
+                        <a:lnSpc>
+                          <a:spcPts val="1275"/>
+                        </a:lnSpc>
+                        <a:spcAft>
+                          <a:spcPts val="800"/>
+                        </a:spcAft>
+                        <a:buNone/>
+                      </a:pPr>
+                      <a:r>
+                        <a:rPr lang="en-GB" sz="1600" b="0" u="none" strike="noStrike">
+                          <a:solidFill>
+                            <a:srgbClr val="595959"/>
+                          </a:solidFill>
+                          <a:effectLst/>
+                        </a:rPr>
+                        <a:t>Demand on the system </a:t>
+                      </a:r>
+                      <a:endParaRPr lang="en-GB" sz="3000" b="0" i="0" u="none" strike="noStrike">
+                        <a:effectLst/>
+                        <a:latin typeface="Arial" panose="020B0604020202020204" pitchFamily="34" charset="0"/>
+                      </a:endParaRPr>
+                    </a:p>
+                  </a:txBody>
+                  <a:tcPr marL="93353" marR="93353" marT="46675" marB="46675" anchor="ctr"/>
+                </a:tc>
+                <a:tc>
+                  <a:txBody>
+                    <a:bodyPr/>
+                    <a:lstStyle/>
+                    <a:p>
+                      <a:pPr algn="ctr" rtl="0" fontAlgn="base">
+                        <a:lnSpc>
+                          <a:spcPts val="1275"/>
+                        </a:lnSpc>
+                        <a:spcAft>
+                          <a:spcPts val="800"/>
+                        </a:spcAft>
+                        <a:buNone/>
+                      </a:pPr>
+                      <a:r>
+                        <a:rPr lang="en-US" sz="1600" b="0" u="none" strike="noStrike">
+                          <a:solidFill>
+                            <a:srgbClr val="595959"/>
+                          </a:solidFill>
+                          <a:effectLst/>
+                        </a:rPr>
+                        <a:t>Total clients during open hours </a:t>
+                      </a:r>
+                      <a:endParaRPr lang="en-US" sz="3000" b="0" i="0" u="none" strike="noStrike">
+                        <a:effectLst/>
+                        <a:latin typeface="Arial" panose="020B0604020202020204" pitchFamily="34" charset="0"/>
+                      </a:endParaRPr>
+                    </a:p>
+                  </a:txBody>
+                  <a:tcPr marL="93353" marR="93353" marT="46675" marB="46675" anchor="ctr"/>
+                </a:tc>
+                <a:extLst>
+                  <a:ext uri="{0D108BD9-81ED-4DB2-BD59-A6C34878D82A}">
+                    <a16:rowId xmlns:a16="http://schemas.microsoft.com/office/drawing/2014/main" val="2841116656"/>
+                  </a:ext>
+                </a:extLst>
+              </a:tr>
+              <a:tr h="653825">
+                <a:tc>
+                  <a:txBody>
+                    <a:bodyPr/>
+                    <a:lstStyle/>
+                    <a:p>
+                      <a:pPr algn="ctr" rtl="0" fontAlgn="base">
+                        <a:lnSpc>
+                          <a:spcPts val="1275"/>
+                        </a:lnSpc>
+                        <a:spcAft>
+                          <a:spcPts val="800"/>
+                        </a:spcAft>
+                        <a:buNone/>
+                      </a:pPr>
+                      <a:r>
+                        <a:rPr lang="en-GB" sz="1600" b="0" u="none" strike="noStrike" dirty="0">
+                          <a:solidFill>
+                            <a:srgbClr val="595959"/>
+                          </a:solidFill>
+                          <a:effectLst/>
+                        </a:rPr>
+                        <a:t>Throughput </a:t>
+                      </a:r>
+                      <a:endParaRPr lang="en-GB" sz="3000" b="0" i="0" u="none" strike="noStrike" dirty="0">
+                        <a:effectLst/>
+                        <a:latin typeface="Arial" panose="020B0604020202020204" pitchFamily="34" charset="0"/>
+                      </a:endParaRPr>
+                    </a:p>
+                  </a:txBody>
+                  <a:tcPr marL="93353" marR="93353" marT="46675" marB="46675" anchor="ctr"/>
+                </a:tc>
+                <a:tc>
+                  <a:txBody>
+                    <a:bodyPr/>
+                    <a:lstStyle/>
+                    <a:p>
+                      <a:pPr algn="ctr" rtl="0" fontAlgn="base">
+                        <a:lnSpc>
+                          <a:spcPts val="1275"/>
+                        </a:lnSpc>
+                        <a:spcAft>
+                          <a:spcPts val="800"/>
+                        </a:spcAft>
+                        <a:buNone/>
+                      </a:pPr>
+                      <a:r>
+                        <a:rPr lang="en-GB" sz="1600" b="0" u="none" strike="noStrike" dirty="0">
+                          <a:solidFill>
+                            <a:srgbClr val="595959"/>
+                          </a:solidFill>
+                          <a:effectLst/>
+                        </a:rPr>
+                        <a:t>Capacity Delivered </a:t>
+                      </a:r>
+                      <a:endParaRPr lang="en-GB" sz="3000" b="0" i="0" u="none" strike="noStrike" dirty="0">
+                        <a:effectLst/>
+                        <a:latin typeface="Arial" panose="020B0604020202020204" pitchFamily="34" charset="0"/>
+                      </a:endParaRPr>
+                    </a:p>
+                  </a:txBody>
+                  <a:tcPr marL="93353" marR="93353" marT="46675" marB="46675" anchor="ctr"/>
+                </a:tc>
+                <a:tc>
+                  <a:txBody>
+                    <a:bodyPr/>
+                    <a:lstStyle/>
+                    <a:p>
+                      <a:pPr algn="ctr" rtl="0" fontAlgn="base">
+                        <a:lnSpc>
+                          <a:spcPts val="1275"/>
+                        </a:lnSpc>
+                        <a:spcAft>
+                          <a:spcPts val="800"/>
+                        </a:spcAft>
+                        <a:buNone/>
+                      </a:pPr>
+                      <a:r>
+                        <a:rPr lang="en-US" sz="1600" b="0" u="none" strike="noStrike" dirty="0">
+                          <a:solidFill>
+                            <a:srgbClr val="595959"/>
+                          </a:solidFill>
+                          <a:effectLst/>
+                        </a:rPr>
+                        <a:t>Amount of filament used – Filament wasted in failed parts (both based off manufacture flow rate and time spent active) </a:t>
+                      </a:r>
+                      <a:endParaRPr lang="en-US" sz="3000" b="0" i="0" u="none" strike="noStrike" dirty="0">
+                        <a:effectLst/>
+                        <a:latin typeface="Arial" panose="020B0604020202020204" pitchFamily="34" charset="0"/>
+                      </a:endParaRPr>
+                    </a:p>
+                  </a:txBody>
+                  <a:tcPr marL="93353" marR="93353" marT="46675" marB="46675" anchor="ctr"/>
+                </a:tc>
+                <a:extLst>
+                  <a:ext uri="{0D108BD9-81ED-4DB2-BD59-A6C34878D82A}">
+                    <a16:rowId xmlns:a16="http://schemas.microsoft.com/office/drawing/2014/main" val="53482816"/>
+                  </a:ext>
+                </a:extLst>
+              </a:tr>
+              <a:tr h="653825">
+                <a:tc>
+                  <a:txBody>
+                    <a:bodyPr/>
+                    <a:lstStyle/>
+                    <a:p>
+                      <a:pPr algn="ctr" rtl="0" fontAlgn="base">
+                        <a:lnSpc>
+                          <a:spcPts val="1275"/>
+                        </a:lnSpc>
+                        <a:spcAft>
+                          <a:spcPts val="800"/>
+                        </a:spcAft>
+                        <a:buNone/>
+                      </a:pPr>
+                      <a:r>
+                        <a:rPr lang="en-US" sz="1600" b="0" u="none" strike="noStrike">
+                          <a:solidFill>
+                            <a:srgbClr val="595959"/>
+                          </a:solidFill>
+                          <a:effectLst/>
+                        </a:rPr>
+                        <a:t>Avg Wait to Start Printing </a:t>
+                      </a:r>
+                      <a:endParaRPr lang="en-US" sz="3000" b="0" i="0" u="none" strike="noStrike">
+                        <a:effectLst/>
+                        <a:latin typeface="Arial" panose="020B0604020202020204" pitchFamily="34" charset="0"/>
+                      </a:endParaRPr>
+                    </a:p>
+                  </a:txBody>
+                  <a:tcPr marL="93353" marR="93353" marT="46675" marB="46675" anchor="ctr"/>
+                </a:tc>
+                <a:tc>
+                  <a:txBody>
+                    <a:bodyPr/>
+                    <a:lstStyle/>
+                    <a:p>
+                      <a:pPr algn="ctr" rtl="0" fontAlgn="base">
+                        <a:lnSpc>
+                          <a:spcPts val="1275"/>
+                        </a:lnSpc>
+                        <a:spcAft>
+                          <a:spcPts val="800"/>
+                        </a:spcAft>
+                        <a:buNone/>
+                      </a:pPr>
+                      <a:r>
+                        <a:rPr lang="en-GB" sz="1600" b="0" u="none" strike="noStrike" dirty="0">
+                          <a:solidFill>
+                            <a:srgbClr val="595959"/>
+                          </a:solidFill>
+                          <a:effectLst/>
+                        </a:rPr>
+                        <a:t>Queue experience </a:t>
+                      </a:r>
+                      <a:endParaRPr lang="en-GB" sz="3000" b="0" i="0" u="none" strike="noStrike" dirty="0">
+                        <a:effectLst/>
+                        <a:latin typeface="Arial" panose="020B0604020202020204" pitchFamily="34" charset="0"/>
+                      </a:endParaRPr>
+                    </a:p>
+                  </a:txBody>
+                  <a:tcPr marL="93353" marR="93353" marT="46675" marB="46675" anchor="ctr"/>
+                </a:tc>
+                <a:tc>
+                  <a:txBody>
+                    <a:bodyPr/>
+                    <a:lstStyle/>
+                    <a:p>
+                      <a:pPr algn="ctr" rtl="0" fontAlgn="base">
+                        <a:lnSpc>
+                          <a:spcPts val="1275"/>
+                        </a:lnSpc>
+                        <a:spcAft>
+                          <a:spcPts val="800"/>
+                        </a:spcAft>
+                        <a:buNone/>
+                      </a:pPr>
+                      <a:r>
+                        <a:rPr lang="en-US" sz="1600" b="0" u="none" strike="noStrike">
+                          <a:solidFill>
+                            <a:srgbClr val="595959"/>
+                          </a:solidFill>
+                          <a:effectLst/>
+                        </a:rPr>
+                        <a:t>Mean (time from arrival → print start) </a:t>
+                      </a:r>
+                      <a:endParaRPr lang="en-US" sz="3000" b="0" i="0" u="none" strike="noStrike">
+                        <a:effectLst/>
+                        <a:latin typeface="Arial" panose="020B0604020202020204" pitchFamily="34" charset="0"/>
+                      </a:endParaRPr>
+                    </a:p>
+                  </a:txBody>
+                  <a:tcPr marL="93353" marR="93353" marT="46675" marB="46675" anchor="ctr"/>
+                </a:tc>
+                <a:extLst>
+                  <a:ext uri="{0D108BD9-81ED-4DB2-BD59-A6C34878D82A}">
+                    <a16:rowId xmlns:a16="http://schemas.microsoft.com/office/drawing/2014/main" val="537971573"/>
+                  </a:ext>
+                </a:extLst>
+              </a:tr>
+              <a:tr h="653825">
+                <a:tc>
+                  <a:txBody>
+                    <a:bodyPr/>
+                    <a:lstStyle/>
+                    <a:p>
+                      <a:pPr algn="ctr" rtl="0" fontAlgn="base">
+                        <a:lnSpc>
+                          <a:spcPts val="1275"/>
+                        </a:lnSpc>
+                        <a:spcAft>
+                          <a:spcPts val="800"/>
+                        </a:spcAft>
+                        <a:buNone/>
+                      </a:pPr>
+                      <a:r>
+                        <a:rPr lang="en-GB" sz="1600" b="0" u="none" strike="noStrike">
+                          <a:solidFill>
+                            <a:srgbClr val="595959"/>
+                          </a:solidFill>
+                          <a:effectLst/>
+                        </a:rPr>
+                        <a:t>Printer Utilization </a:t>
+                      </a:r>
+                      <a:endParaRPr lang="en-GB" sz="3000" b="0" i="0" u="none" strike="noStrike">
+                        <a:effectLst/>
+                        <a:latin typeface="Arial" panose="020B0604020202020204" pitchFamily="34" charset="0"/>
+                      </a:endParaRPr>
+                    </a:p>
+                  </a:txBody>
+                  <a:tcPr marL="93353" marR="93353" marT="46675" marB="46675" anchor="ctr"/>
+                </a:tc>
+                <a:tc>
+                  <a:txBody>
+                    <a:bodyPr/>
+                    <a:lstStyle/>
+                    <a:p>
+                      <a:pPr algn="ctr" rtl="0" fontAlgn="base">
+                        <a:lnSpc>
+                          <a:spcPts val="1275"/>
+                        </a:lnSpc>
+                        <a:spcAft>
+                          <a:spcPts val="800"/>
+                        </a:spcAft>
+                        <a:buNone/>
+                      </a:pPr>
+                      <a:r>
+                        <a:rPr lang="en-GB" sz="1600" b="0" u="none" strike="noStrike">
+                          <a:solidFill>
+                            <a:srgbClr val="595959"/>
+                          </a:solidFill>
+                          <a:effectLst/>
+                        </a:rPr>
+                        <a:t>Resource Reload </a:t>
+                      </a:r>
+                      <a:endParaRPr lang="en-GB" sz="3000" b="0" i="0" u="none" strike="noStrike">
+                        <a:effectLst/>
+                        <a:latin typeface="Arial" panose="020B0604020202020204" pitchFamily="34" charset="0"/>
+                      </a:endParaRPr>
+                    </a:p>
+                  </a:txBody>
+                  <a:tcPr marL="93353" marR="93353" marT="46675" marB="46675" anchor="ctr"/>
+                </a:tc>
+                <a:tc>
+                  <a:txBody>
+                    <a:bodyPr/>
+                    <a:lstStyle/>
+                    <a:p>
+                      <a:pPr algn="ctr" rtl="0" fontAlgn="base">
+                        <a:lnSpc>
+                          <a:spcPts val="1275"/>
+                        </a:lnSpc>
+                        <a:spcAft>
+                          <a:spcPts val="800"/>
+                        </a:spcAft>
+                        <a:buNone/>
+                      </a:pPr>
+                      <a:r>
+                        <a:rPr lang="en-US" sz="1600" b="0" u="none" strike="noStrike" dirty="0">
+                          <a:solidFill>
+                            <a:srgbClr val="595959"/>
+                          </a:solidFill>
+                          <a:effectLst/>
+                        </a:rPr>
+                        <a:t>(Sum of print busy time across printers) ÷ (open time × #printers) </a:t>
+                      </a:r>
+                      <a:endParaRPr lang="en-US" sz="3000" b="0" i="0" u="none" strike="noStrike" dirty="0">
+                        <a:effectLst/>
+                        <a:latin typeface="Arial" panose="020B0604020202020204" pitchFamily="34" charset="0"/>
+                      </a:endParaRPr>
+                    </a:p>
+                  </a:txBody>
+                  <a:tcPr marL="93353" marR="93353" marT="46675" marB="46675" anchor="ctr"/>
+                </a:tc>
+                <a:extLst>
+                  <a:ext uri="{0D108BD9-81ED-4DB2-BD59-A6C34878D82A}">
+                    <a16:rowId xmlns:a16="http://schemas.microsoft.com/office/drawing/2014/main" val="2214046341"/>
+                  </a:ext>
+                </a:extLst>
+              </a:tr>
+              <a:tr h="637988">
+                <a:tc>
+                  <a:txBody>
+                    <a:bodyPr/>
+                    <a:lstStyle/>
+                    <a:p>
+                      <a:pPr algn="ctr" rtl="0" fontAlgn="base">
+                        <a:lnSpc>
+                          <a:spcPts val="1275"/>
+                        </a:lnSpc>
+                        <a:spcAft>
+                          <a:spcPts val="800"/>
+                        </a:spcAft>
+                        <a:buNone/>
+                      </a:pPr>
+                      <a:r>
+                        <a:rPr lang="en-GB" sz="1600" b="0" u="none" strike="noStrike">
+                          <a:solidFill>
+                            <a:srgbClr val="595959"/>
+                          </a:solidFill>
+                          <a:effectLst/>
+                        </a:rPr>
+                        <a:t>Failure rate </a:t>
+                      </a:r>
+                      <a:endParaRPr lang="en-GB" sz="3000" b="0" i="0" u="none" strike="noStrike">
+                        <a:effectLst/>
+                        <a:latin typeface="Arial" panose="020B0604020202020204" pitchFamily="34" charset="0"/>
+                      </a:endParaRPr>
+                    </a:p>
+                  </a:txBody>
+                  <a:tcPr marL="93353" marR="93353" marT="46675" marB="46675" anchor="ctr"/>
+                </a:tc>
+                <a:tc>
+                  <a:txBody>
+                    <a:bodyPr/>
+                    <a:lstStyle/>
+                    <a:p>
+                      <a:pPr algn="ctr" rtl="0" fontAlgn="base">
+                        <a:lnSpc>
+                          <a:spcPts val="1275"/>
+                        </a:lnSpc>
+                        <a:spcAft>
+                          <a:spcPts val="800"/>
+                        </a:spcAft>
+                        <a:buNone/>
+                      </a:pPr>
+                      <a:r>
+                        <a:rPr lang="en-GB" sz="1600" b="0" u="none" strike="noStrike">
+                          <a:solidFill>
+                            <a:srgbClr val="595959"/>
+                          </a:solidFill>
+                          <a:effectLst/>
+                        </a:rPr>
+                        <a:t>Rework/ quality pressure </a:t>
+                      </a:r>
+                      <a:endParaRPr lang="en-GB" sz="3000" b="0" i="0" u="none" strike="noStrike">
+                        <a:effectLst/>
+                        <a:latin typeface="Arial" panose="020B0604020202020204" pitchFamily="34" charset="0"/>
+                      </a:endParaRPr>
+                    </a:p>
+                  </a:txBody>
+                  <a:tcPr marL="93353" marR="93353" marT="46675" marB="46675" anchor="ctr"/>
+                </a:tc>
+                <a:tc>
+                  <a:txBody>
+                    <a:bodyPr/>
+                    <a:lstStyle/>
+                    <a:p>
+                      <a:pPr marL="0" marR="0" lvl="0" indent="0" algn="ctr" defTabSz="914400" rtl="0" eaLnBrk="1" fontAlgn="t" latinLnBrk="0" hangingPunct="1">
+                        <a:lnSpc>
+                          <a:spcPct val="100000"/>
+                        </a:lnSpc>
+                        <a:spcBef>
+                          <a:spcPts val="0"/>
+                        </a:spcBef>
+                        <a:spcAft>
+                          <a:spcPts val="0"/>
+                        </a:spcAft>
+                        <a:buClrTx/>
+                        <a:buSzTx/>
+                        <a:buFontTx/>
+                        <a:buNone/>
+                        <a:tabLst/>
+                        <a:defRPr/>
+                      </a:pPr>
+                      <a:r>
+                        <a:rPr lang="en-US" sz="1600" b="0" u="none" strike="noStrike" dirty="0">
+                          <a:solidFill>
+                            <a:srgbClr val="595959"/>
+                          </a:solidFill>
+                          <a:effectLst/>
+                        </a:rPr>
+                        <a:t>(# jobs that fail at least once) ÷ (total jobs started) </a:t>
+                      </a:r>
+                      <a:endParaRPr lang="en-US" sz="1600" b="0" u="none" strike="noStrike" dirty="0">
+                        <a:effectLst/>
+                      </a:endParaRPr>
+                    </a:p>
+                  </a:txBody>
+                  <a:tcPr marL="93353" marR="93353" marT="46675" marB="46675" anchor="ctr"/>
+                </a:tc>
+                <a:extLst>
+                  <a:ext uri="{0D108BD9-81ED-4DB2-BD59-A6C34878D82A}">
+                    <a16:rowId xmlns:a16="http://schemas.microsoft.com/office/drawing/2014/main" val="2513757338"/>
+                  </a:ext>
+                </a:extLst>
+              </a:tr>
+            </a:tbl>
+          </a:graphicData>
+        </a:graphic>
+      </p:graphicFrame>
     </p:spTree>
     <p:extLst>
       <p:ext uri="{BB962C8B-B14F-4D97-AF65-F5344CB8AC3E}">
-        <p14:creationId xmlns:p14="http://schemas.microsoft.com/office/powerpoint/2010/main" val="2468595790"/>
-      </p:ext>
-    </p:extLst>
-  </p:cSld>
-  <p:clrMapOvr>
-    <a:masterClrMapping/>
-  </p:clrMapOvr>
-</p:sld>
-</file>
-
-<file path=ppt/slides/slide8.xml><?xml version="1.0" encoding="utf-8"?>
-<p:sld xmlns:a="http://schemas.openxmlformats.org/drawingml/2006/main" xmlns:r="http://schemas.openxmlformats.org/officeDocument/2006/relationships" xmlns:p="http://schemas.openxmlformats.org/presentationml/2006/main">
-  <p:cSld>
-    <p:spTree>
-      <p:nvGrpSpPr>
-        <p:cNvPr id="1" name=""/>
-        <p:cNvGrpSpPr/>
-        <p:nvPr/>
-      </p:nvGrpSpPr>
-      <p:grpSpPr>
-        <a:xfrm>
-          <a:off x="0" y="0"/>
-          <a:ext cx="0" cy="0"/>
-          <a:chOff x="0" y="0"/>
-          <a:chExt cx="0" cy="0"/>
-        </a:xfrm>
-      </p:grpSpPr>
-      <p:sp>
-        <p:nvSpPr>
-          <p:cNvPr id="3" name="Title 2">
-            <a:extLst>
-              <a:ext uri="{FF2B5EF4-FFF2-40B4-BE49-F238E27FC236}">
-                <a16:creationId xmlns:a16="http://schemas.microsoft.com/office/drawing/2014/main" id="{3D55F2D4-C20E-BEBC-1CCF-4449B0456A7E}"/>
-              </a:ext>
-            </a:extLst>
-          </p:cNvPr>
-          <p:cNvSpPr>
-            <a:spLocks noGrp="1"/>
-          </p:cNvSpPr>
-          <p:nvPr>
-            <p:ph type="title"/>
-          </p:nvPr>
-        </p:nvSpPr>
-        <p:spPr>
-          <a:xfrm>
-            <a:off x="914400" y="965393"/>
-            <a:ext cx="7631709" cy="1091627"/>
-          </a:xfrm>
-        </p:spPr>
-        <p:txBody>
-          <a:bodyPr/>
-          <a:lstStyle/>
-          <a:p>
-            <a:r>
-              <a:rPr lang="en-US" dirty="0"/>
-              <a:t>Navigating Q&amp;A </a:t>
-            </a:r>
-            <a:br>
-              <a:rPr lang="en-US" dirty="0"/>
-            </a:br>
-            <a:r>
-              <a:rPr lang="en-US" dirty="0"/>
-              <a:t>sessions</a:t>
-            </a:r>
-          </a:p>
-        </p:txBody>
-      </p:sp>
-      <p:sp>
-        <p:nvSpPr>
-          <p:cNvPr id="14" name="Content Placeholder 7">
-            <a:extLst>
-              <a:ext uri="{FF2B5EF4-FFF2-40B4-BE49-F238E27FC236}">
-                <a16:creationId xmlns:a16="http://schemas.microsoft.com/office/drawing/2014/main" id="{749C7CD1-A9AA-49E3-6734-AD9546F2DF5B}"/>
-              </a:ext>
-            </a:extLst>
-          </p:cNvPr>
-          <p:cNvSpPr>
-            <a:spLocks noGrp="1"/>
-          </p:cNvSpPr>
-          <p:nvPr>
-            <p:ph sz="half" idx="15"/>
-          </p:nvPr>
-        </p:nvSpPr>
-        <p:spPr>
-          <a:xfrm>
-            <a:off x="914400" y="2303463"/>
-            <a:ext cx="3282950" cy="4143375"/>
-          </a:xfrm>
-        </p:spPr>
-        <p:txBody>
-          <a:bodyPr>
-            <a:normAutofit/>
-          </a:bodyPr>
-          <a:lstStyle/>
-          <a:p>
-            <a:r>
-              <a:rPr lang="en-US" dirty="0"/>
-              <a:t>Maintaining composure during the Q&amp;A session is essential for projecting confidence and authority. Consider the following tips for staying composed:</a:t>
-            </a:r>
-          </a:p>
-          <a:p>
-            <a:r>
-              <a:rPr lang="en-US" dirty="0"/>
-              <a:t>Stay calm</a:t>
-            </a:r>
-          </a:p>
-          <a:p>
-            <a:r>
-              <a:rPr lang="en-US" dirty="0"/>
-              <a:t>Actively listen</a:t>
-            </a:r>
-          </a:p>
-          <a:p>
-            <a:r>
-              <a:rPr lang="en-US" dirty="0"/>
-              <a:t>Pause and reflect</a:t>
-            </a:r>
-          </a:p>
-          <a:p>
-            <a:r>
-              <a:rPr lang="en-US" dirty="0"/>
-              <a:t>Maintain eye contact</a:t>
-            </a:r>
-          </a:p>
-        </p:txBody>
-      </p:sp>
-      <p:sp>
-        <p:nvSpPr>
-          <p:cNvPr id="13" name="Content Placeholder 5">
-            <a:extLst>
-              <a:ext uri="{FF2B5EF4-FFF2-40B4-BE49-F238E27FC236}">
-                <a16:creationId xmlns:a16="http://schemas.microsoft.com/office/drawing/2014/main" id="{58AC0C8B-8A7A-9FAE-2D0F-4D1C3A8C3FA5}"/>
-              </a:ext>
-            </a:extLst>
-          </p:cNvPr>
-          <p:cNvSpPr>
-            <a:spLocks noGrp="1"/>
-          </p:cNvSpPr>
-          <p:nvPr>
-            <p:ph sz="half" idx="1"/>
-          </p:nvPr>
-        </p:nvSpPr>
-        <p:spPr>
-          <a:xfrm>
-            <a:off x="4781550" y="2303463"/>
-            <a:ext cx="3763963" cy="4143375"/>
-          </a:xfrm>
-        </p:spPr>
-        <p:txBody>
-          <a:bodyPr/>
-          <a:lstStyle/>
-          <a:p>
-            <a:r>
-              <a:rPr lang="en-US" dirty="0"/>
-              <a:t>Know your material in advance</a:t>
-            </a:r>
-          </a:p>
-          <a:p>
-            <a:r>
-              <a:rPr lang="en-US" dirty="0"/>
-              <a:t>Anticipate common questions</a:t>
-            </a:r>
-          </a:p>
-          <a:p>
-            <a:r>
-              <a:rPr lang="en-US" dirty="0"/>
-              <a:t>Rehearse your responses</a:t>
-            </a:r>
-          </a:p>
-        </p:txBody>
-      </p:sp>
-      <p:pic>
-        <p:nvPicPr>
-          <p:cNvPr id="10" name="Picture Placeholder 9" descr="A person wearing a blue suit and headphones pointing at a computer">
-            <a:extLst>
-              <a:ext uri="{FF2B5EF4-FFF2-40B4-BE49-F238E27FC236}">
-                <a16:creationId xmlns:a16="http://schemas.microsoft.com/office/drawing/2014/main" id="{DD0A0899-5B02-CEB5-E5DD-448B169C2377}"/>
-              </a:ext>
-            </a:extLst>
-          </p:cNvPr>
-          <p:cNvPicPr>
-            <a:picLocks noGrp="1" noChangeAspect="1"/>
-          </p:cNvPicPr>
-          <p:nvPr>
-            <p:ph type="pic" sz="quarter" idx="14"/>
-          </p:nvPr>
-        </p:nvPicPr>
-        <p:blipFill rotWithShape="1">
-          <a:blip r:embed="rId3">
-            <a:duotone>
-              <a:prstClr val="black"/>
-              <a:schemeClr val="accent1">
-                <a:tint val="45000"/>
-                <a:satMod val="400000"/>
-              </a:schemeClr>
-            </a:duotone>
-          </a:blip>
-          <a:srcRect l="31888" r="31888"/>
-          <a:stretch/>
-        </p:blipFill>
-        <p:spPr>
-          <a:xfrm>
-            <a:off x="8989454" y="965393"/>
-            <a:ext cx="3202545" cy="5892607"/>
-          </a:xfrm>
-        </p:spPr>
-      </p:pic>
-      <p:sp>
-        <p:nvSpPr>
-          <p:cNvPr id="4" name="Slide Number Placeholder 3">
-            <a:extLst>
-              <a:ext uri="{FF2B5EF4-FFF2-40B4-BE49-F238E27FC236}">
-                <a16:creationId xmlns:a16="http://schemas.microsoft.com/office/drawing/2014/main" id="{C82CE1B8-1C92-D6D2-444B-652DB90E86D1}"/>
-              </a:ext>
-            </a:extLst>
-          </p:cNvPr>
-          <p:cNvSpPr>
-            <a:spLocks noGrp="1"/>
-          </p:cNvSpPr>
-          <p:nvPr>
-            <p:ph type="sldNum" sz="quarter" idx="10"/>
-          </p:nvPr>
-        </p:nvSpPr>
-        <p:spPr>
-          <a:xfrm>
-            <a:off x="10358437" y="457199"/>
-            <a:ext cx="1067589" cy="471489"/>
-          </a:xfrm>
-        </p:spPr>
-        <p:txBody>
-          <a:bodyPr/>
-          <a:lstStyle/>
-          <a:p>
-            <a:fld id="{48F63A3B-78C7-47BE-AE5E-E10140E04643}" type="slidenum">
-              <a:rPr lang="en-US" smtClean="0"/>
-              <a:pPr/>
-              <a:t>8</a:t>
-            </a:fld>
-            <a:endParaRPr lang="en-US" dirty="0"/>
-          </a:p>
-        </p:txBody>
-      </p:sp>
-    </p:spTree>
-    <p:extLst>
-      <p:ext uri="{BB962C8B-B14F-4D97-AF65-F5344CB8AC3E}">
-        <p14:creationId xmlns:p14="http://schemas.microsoft.com/office/powerpoint/2010/main" val="1941619646"/>
-      </p:ext>
-    </p:extLst>
-  </p:cSld>
-  <p:clrMapOvr>
-    <a:masterClrMapping/>
-  </p:clrMapOvr>
-</p:sld>
-</file>
-
-<file path=ppt/slides/slide9.xml><?xml version="1.0" encoding="utf-8"?>
-<p:sld xmlns:a="http://schemas.openxmlformats.org/drawingml/2006/main" xmlns:r="http://schemas.openxmlformats.org/officeDocument/2006/relationships" xmlns:p="http://schemas.openxmlformats.org/presentationml/2006/main">
-  <p:cSld>
-    <p:spTree>
-      <p:nvGrpSpPr>
-        <p:cNvPr id="1" name=""/>
-        <p:cNvGrpSpPr/>
-        <p:nvPr/>
-      </p:nvGrpSpPr>
-      <p:grpSpPr>
-        <a:xfrm>
-          <a:off x="0" y="0"/>
-          <a:ext cx="0" cy="0"/>
-          <a:chOff x="0" y="0"/>
-          <a:chExt cx="0" cy="0"/>
-        </a:xfrm>
-      </p:grpSpPr>
-      <p:sp>
-        <p:nvSpPr>
-          <p:cNvPr id="3" name="Title 2">
-            <a:extLst>
-              <a:ext uri="{FF2B5EF4-FFF2-40B4-BE49-F238E27FC236}">
-                <a16:creationId xmlns:a16="http://schemas.microsoft.com/office/drawing/2014/main" id="{9443EC8A-1733-CCF7-081F-EB4667CB3285}"/>
-              </a:ext>
-            </a:extLst>
-          </p:cNvPr>
-          <p:cNvSpPr>
-            <a:spLocks noGrp="1"/>
-          </p:cNvSpPr>
-          <p:nvPr>
-            <p:ph type="title"/>
-          </p:nvPr>
-        </p:nvSpPr>
-        <p:spPr>
-          <a:xfrm>
-            <a:off x="914400" y="1057274"/>
-            <a:ext cx="7843837" cy="1012782"/>
-          </a:xfrm>
-        </p:spPr>
-        <p:txBody>
-          <a:bodyPr/>
-          <a:lstStyle/>
-          <a:p>
-            <a:r>
-              <a:rPr lang="en-US" dirty="0"/>
-              <a:t>Speaking impact</a:t>
-            </a:r>
-          </a:p>
-        </p:txBody>
-      </p:sp>
-      <p:sp>
-        <p:nvSpPr>
-          <p:cNvPr id="4" name="Content Placeholder 3">
-            <a:extLst>
-              <a:ext uri="{FF2B5EF4-FFF2-40B4-BE49-F238E27FC236}">
-                <a16:creationId xmlns:a16="http://schemas.microsoft.com/office/drawing/2014/main" id="{ACE55D3D-AA24-CF53-6679-29B3C83F7646}"/>
-              </a:ext>
-            </a:extLst>
-          </p:cNvPr>
-          <p:cNvSpPr>
-            <a:spLocks noGrp="1"/>
-          </p:cNvSpPr>
-          <p:nvPr>
-            <p:ph idx="13"/>
-          </p:nvPr>
-        </p:nvSpPr>
-        <p:spPr>
-          <a:xfrm>
-            <a:off x="914400" y="2331791"/>
-            <a:ext cx="6903076" cy="3721817"/>
-          </a:xfrm>
-        </p:spPr>
-        <p:txBody>
-          <a:bodyPr/>
-          <a:lstStyle/>
-          <a:p>
-            <a:r>
-              <a:rPr lang="en-US" dirty="0"/>
-              <a:t>Your ability to communicate effectively will leave a lasting impact on your audience</a:t>
-            </a:r>
-          </a:p>
-          <a:p>
-            <a:endParaRPr lang="en-US" dirty="0"/>
-          </a:p>
-          <a:p>
-            <a:r>
-              <a:rPr lang="en-US" dirty="0"/>
-              <a:t>Effectively communicating involves not only delivering a message but also resonating with the experiences, values, and emotions of those listening </a:t>
-            </a:r>
-          </a:p>
-        </p:txBody>
-      </p:sp>
-      <p:pic>
-        <p:nvPicPr>
-          <p:cNvPr id="7" name="Picture Placeholder 6" descr="A person wearing glasses and a blue shirt">
-            <a:extLst>
-              <a:ext uri="{FF2B5EF4-FFF2-40B4-BE49-F238E27FC236}">
-                <a16:creationId xmlns:a16="http://schemas.microsoft.com/office/drawing/2014/main" id="{C570EB79-053B-0283-9D2D-6266701EEDDD}"/>
-              </a:ext>
-            </a:extLst>
-          </p:cNvPr>
-          <p:cNvPicPr>
-            <a:picLocks noGrp="1" noChangeAspect="1"/>
-          </p:cNvPicPr>
-          <p:nvPr>
-            <p:ph type="pic" sz="quarter" idx="14"/>
-          </p:nvPr>
-        </p:nvPicPr>
-        <p:blipFill rotWithShape="1">
-          <a:blip r:embed="rId3">
-            <a:duotone>
-              <a:prstClr val="black"/>
-              <a:schemeClr val="accent4">
-                <a:tint val="45000"/>
-                <a:satMod val="400000"/>
-              </a:schemeClr>
-            </a:duotone>
-          </a:blip>
-          <a:srcRect l="19088" r="19088"/>
-          <a:stretch/>
-        </p:blipFill>
-        <p:spPr>
-          <a:xfrm>
-            <a:off x="8989454" y="3405189"/>
-            <a:ext cx="3202546" cy="3452811"/>
-          </a:xfrm>
-        </p:spPr>
-      </p:pic>
-      <p:sp>
-        <p:nvSpPr>
-          <p:cNvPr id="2" name="Slide Number Placeholder 1">
-            <a:extLst>
-              <a:ext uri="{FF2B5EF4-FFF2-40B4-BE49-F238E27FC236}">
-                <a16:creationId xmlns:a16="http://schemas.microsoft.com/office/drawing/2014/main" id="{AB69D854-FB65-0E93-CFE2-041F7C41DD24}"/>
-              </a:ext>
-            </a:extLst>
-          </p:cNvPr>
-          <p:cNvSpPr>
-            <a:spLocks noGrp="1"/>
-          </p:cNvSpPr>
-          <p:nvPr>
-            <p:ph type="sldNum" sz="quarter" idx="10"/>
-          </p:nvPr>
-        </p:nvSpPr>
-        <p:spPr>
-          <a:xfrm>
-            <a:off x="10438475" y="457199"/>
-            <a:ext cx="987552" cy="471489"/>
-          </a:xfrm>
-        </p:spPr>
-        <p:txBody>
-          <a:bodyPr/>
-          <a:lstStyle/>
-          <a:p>
-            <a:fld id="{48F63A3B-78C7-47BE-AE5E-E10140E04643}" type="slidenum">
-              <a:rPr lang="en-US" smtClean="0"/>
-              <a:pPr/>
-              <a:t>9</a:t>
-            </a:fld>
-            <a:endParaRPr lang="en-US" dirty="0"/>
-          </a:p>
-        </p:txBody>
-      </p:sp>
-    </p:spTree>
-    <p:extLst>
-      <p:ext uri="{BB962C8B-B14F-4D97-AF65-F5344CB8AC3E}">
-        <p14:creationId xmlns:p14="http://schemas.microsoft.com/office/powerpoint/2010/main" val="4072101725"/>
+        <p14:creationId xmlns:p14="http://schemas.microsoft.com/office/powerpoint/2010/main" val="2755129491"/>
       </p:ext>
     </p:extLst>
   </p:cSld>
@@ -21487,26 +18853,6 @@
 </file>
 
 <file path=customXml/item1.xml><?xml version="1.0" encoding="utf-8"?>
-<p:properties xmlns:p="http://schemas.microsoft.com/office/2006/metadata/properties" xmlns:xsi="http://www.w3.org/2001/XMLSchema-instance" xmlns:pc="http://schemas.microsoft.com/office/infopath/2007/PartnerControls">
-  <documentManagement>
-    <_ip_UnifiedCompliancePolicyUIAction xmlns="http://schemas.microsoft.com/sharepoint/v3" xsi:nil="true"/>
-    <Image xmlns="71af3243-3dd4-4a8d-8c0d-dd76da1f02a5">
-      <Url xsi:nil="true"/>
-      <Description xsi:nil="true"/>
-    </Image>
-    <Status xmlns="71af3243-3dd4-4a8d-8c0d-dd76da1f02a5">Not started</Status>
-    <Background xmlns="71af3243-3dd4-4a8d-8c0d-dd76da1f02a5">false</Background>
-    <_ip_UnifiedCompliancePolicyProperties xmlns="http://schemas.microsoft.com/sharepoint/v3" xsi:nil="true"/>
-    <ImageTagsTaxHTField xmlns="71af3243-3dd4-4a8d-8c0d-dd76da1f02a5">
-      <Terms xmlns="http://schemas.microsoft.com/office/infopath/2007/PartnerControls"/>
-    </ImageTagsTaxHTField>
-    <TaxCatchAll xmlns="230e9df3-be65-4c73-a93b-d1236ebd677e" xsi:nil="true"/>
-    <MediaServiceKeyPoints xmlns="71af3243-3dd4-4a8d-8c0d-dd76da1f02a5" xsi:nil="true"/>
-  </documentManagement>
-</p:properties>
-</file>
-
-<file path=customXml/item2.xml><?xml version="1.0" encoding="utf-8"?>
 <?mso-contentType ?>
 <FormTemplates xmlns="http://schemas.microsoft.com/sharepoint/v3/contenttype/forms">
   <Display>DocumentLibraryForm</Display>
@@ -21515,7 +18861,7 @@
 </FormTemplates>
 </file>
 
-<file path=customXml/item3.xml><?xml version="1.0" encoding="utf-8"?>
+<file path=customXml/item2.xml><?xml version="1.0" encoding="utf-8"?>
 <ct:contentTypeSchema xmlns:ct="http://schemas.microsoft.com/office/2006/metadata/contentType" xmlns:ma="http://schemas.microsoft.com/office/2006/metadata/properties/metaAttributes" ct:_="" ma:_="" ma:contentTypeName="Document" ma:contentTypeID="0x01010079F111ED35F8CC479449609E8A0923A6" ma:contentTypeVersion="28" ma:contentTypeDescription="Create a new document." ma:contentTypeScope="" ma:versionID="60f5a4f2d2b0abadcf532d48ebf9cb71">
   <xsd:schema xmlns:xsd="http://www.w3.org/2001/XMLSchema" xmlns:xs="http://www.w3.org/2001/XMLSchema" xmlns:p="http://schemas.microsoft.com/office/2006/metadata/properties" xmlns:ns1="http://schemas.microsoft.com/sharepoint/v3" xmlns:ns2="71af3243-3dd4-4a8d-8c0d-dd76da1f02a5" xmlns:ns3="16c05727-aa75-4e4a-9b5f-8a80a1165891" xmlns:ns4="230e9df3-be65-4c73-a93b-d1236ebd677e" targetNamespace="http://schemas.microsoft.com/office/2006/metadata/properties" ma:root="true" ma:fieldsID="7dd78129e6a1811f84807ad11c651531" ns1:_="" ns2:_="" ns3:_="" ns4:_="">
     <xsd:import namespace="http://schemas.microsoft.com/sharepoint/v3"/>
@@ -21827,19 +19173,27 @@
 </ct:contentTypeSchema>
 </file>
 
-<file path=customXml/itemProps1.xml><?xml version="1.0" encoding="utf-8"?>
-<ds:datastoreItem xmlns:ds="http://schemas.openxmlformats.org/officeDocument/2006/customXml" ds:itemID="{BA719FA4-954C-4FA8-82CB-206659C3B826}">
-  <ds:schemaRefs>
-    <ds:schemaRef ds:uri="http://schemas.microsoft.com/office/2006/metadata/properties"/>
-    <ds:schemaRef ds:uri="http://schemas.microsoft.com/office/infopath/2007/PartnerControls"/>
-    <ds:schemaRef ds:uri="http://schemas.microsoft.com/sharepoint/v3"/>
-    <ds:schemaRef ds:uri="71af3243-3dd4-4a8d-8c0d-dd76da1f02a5"/>
-    <ds:schemaRef ds:uri="230e9df3-be65-4c73-a93b-d1236ebd677e"/>
-  </ds:schemaRefs>
-</ds:datastoreItem>
+<file path=customXml/item3.xml><?xml version="1.0" encoding="utf-8"?>
+<p:properties xmlns:p="http://schemas.microsoft.com/office/2006/metadata/properties" xmlns:xsi="http://www.w3.org/2001/XMLSchema-instance" xmlns:pc="http://schemas.microsoft.com/office/infopath/2007/PartnerControls">
+  <documentManagement>
+    <_ip_UnifiedCompliancePolicyUIAction xmlns="http://schemas.microsoft.com/sharepoint/v3" xsi:nil="true"/>
+    <Image xmlns="71af3243-3dd4-4a8d-8c0d-dd76da1f02a5">
+      <Url xsi:nil="true"/>
+      <Description xsi:nil="true"/>
+    </Image>
+    <Status xmlns="71af3243-3dd4-4a8d-8c0d-dd76da1f02a5">Not started</Status>
+    <Background xmlns="71af3243-3dd4-4a8d-8c0d-dd76da1f02a5">false</Background>
+    <_ip_UnifiedCompliancePolicyProperties xmlns="http://schemas.microsoft.com/sharepoint/v3" xsi:nil="true"/>
+    <ImageTagsTaxHTField xmlns="71af3243-3dd4-4a8d-8c0d-dd76da1f02a5">
+      <Terms xmlns="http://schemas.microsoft.com/office/infopath/2007/PartnerControls"/>
+    </ImageTagsTaxHTField>
+    <TaxCatchAll xmlns="230e9df3-be65-4c73-a93b-d1236ebd677e" xsi:nil="true"/>
+    <MediaServiceKeyPoints xmlns="71af3243-3dd4-4a8d-8c0d-dd76da1f02a5" xsi:nil="true"/>
+  </documentManagement>
+</p:properties>
 </file>
 
-<file path=customXml/itemProps2.xml><?xml version="1.0" encoding="utf-8"?>
+<file path=customXml/itemProps1.xml><?xml version="1.0" encoding="utf-8"?>
 <ds:datastoreItem xmlns:ds="http://schemas.openxmlformats.org/officeDocument/2006/customXml" ds:itemID="{16DBB56F-4362-4386-A1A1-3DF898896616}">
   <ds:schemaRefs>
     <ds:schemaRef ds:uri="http://schemas.microsoft.com/sharepoint/v3/contenttype/forms"/>
@@ -21847,7 +19201,7 @@
 </ds:datastoreItem>
 </file>
 
-<file path=customXml/itemProps3.xml><?xml version="1.0" encoding="utf-8"?>
+<file path=customXml/itemProps2.xml><?xml version="1.0" encoding="utf-8"?>
 <ds:datastoreItem xmlns:ds="http://schemas.openxmlformats.org/officeDocument/2006/customXml" ds:itemID="{04948363-B267-4BAC-8655-100FBEC280C1}">
   <ds:schemaRefs>
     <ds:schemaRef ds:uri="http://schemas.microsoft.com/office/2006/metadata/contentType"/>
@@ -21868,6 +19222,18 @@
 </ds:datastoreItem>
 </file>
 
+<file path=customXml/itemProps3.xml><?xml version="1.0" encoding="utf-8"?>
+<ds:datastoreItem xmlns:ds="http://schemas.openxmlformats.org/officeDocument/2006/customXml" ds:itemID="{BA719FA4-954C-4FA8-82CB-206659C3B826}">
+  <ds:schemaRefs>
+    <ds:schemaRef ds:uri="http://schemas.microsoft.com/office/2006/metadata/properties"/>
+    <ds:schemaRef ds:uri="http://schemas.microsoft.com/office/infopath/2007/PartnerControls"/>
+    <ds:schemaRef ds:uri="http://schemas.microsoft.com/sharepoint/v3"/>
+    <ds:schemaRef ds:uri="71af3243-3dd4-4a8d-8c0d-dd76da1f02a5"/>
+    <ds:schemaRef ds:uri="230e9df3-be65-4c73-a93b-d1236ebd677e"/>
+  </ds:schemaRefs>
+</ds:datastoreItem>
+</file>
+
 <file path=docMetadata/LabelInfo.xml><?xml version="1.0" encoding="utf-8"?>
 <clbl:labelList xmlns:clbl="http://schemas.microsoft.com/office/2020/mipLabelMetadata"/>
 </file>
</xml_diff>